<commit_message>
set up lots of CSS
</commit_message>
<xml_diff>
--- a/wireframe.pptx
+++ b/wireframe.pptx
@@ -4220,6 +4220,1447 @@
           </a:p>
         </p:txBody>
       </p:sp>
+      <p:sp>
+        <p:nvSpPr>
+          <p:cNvPr id="3" name="Rectangle 2">
+            <a:extLst>
+              <a:ext uri="{FF2B5EF4-FFF2-40B4-BE49-F238E27FC236}">
+                <a16:creationId xmlns:a16="http://schemas.microsoft.com/office/drawing/2014/main" id="{78F3DD19-8C6E-49E2-A900-82F3D1607801}"/>
+              </a:ext>
+            </a:extLst>
+          </p:cNvPr>
+          <p:cNvSpPr/>
+          <p:nvPr/>
+        </p:nvSpPr>
+        <p:spPr>
+          <a:xfrm>
+            <a:off x="838200" y="1457324"/>
+            <a:ext cx="2367013" cy="4345783"/>
+          </a:xfrm>
+          <a:prstGeom prst="rect">
+            <a:avLst/>
+          </a:prstGeom>
+          <a:solidFill>
+            <a:srgbClr val="192C4F"/>
+          </a:solidFill>
+        </p:spPr>
+        <p:style>
+          <a:lnRef idx="2">
+            <a:schemeClr val="accent1">
+              <a:shade val="50000"/>
+            </a:schemeClr>
+          </a:lnRef>
+          <a:fillRef idx="1">
+            <a:schemeClr val="accent1"/>
+          </a:fillRef>
+          <a:effectRef idx="0">
+            <a:schemeClr val="accent1"/>
+          </a:effectRef>
+          <a:fontRef idx="minor">
+            <a:schemeClr val="lt1"/>
+          </a:fontRef>
+        </p:style>
+        <p:txBody>
+          <a:bodyPr rtlCol="0" anchor="ctr"/>
+          <a:lstStyle/>
+          <a:p>
+            <a:r>
+              <a:rPr lang="en-US" sz="1600" dirty="0"/>
+              <a:t>User</a:t>
+            </a:r>
+          </a:p>
+          <a:p>
+            <a:endParaRPr lang="en-US" u="sng" dirty="0"/>
+          </a:p>
+          <a:p>
+            <a:r>
+              <a:rPr lang="en-US" sz="1600" dirty="0"/>
+              <a:t>Password</a:t>
+            </a:r>
+            <a:endParaRPr lang="en-US" dirty="0"/>
+          </a:p>
+          <a:p>
+            <a:br>
+              <a:rPr lang="en-US" sz="900" dirty="0"/>
+            </a:br>
+            <a:r>
+              <a:rPr lang="en-US" sz="1100" dirty="0"/>
+              <a:t>Trouble?</a:t>
+            </a:r>
+          </a:p>
+        </p:txBody>
+      </p:sp>
+      <p:cxnSp>
+        <p:nvCxnSpPr>
+          <p:cNvPr id="6" name="Straight Connector 5">
+            <a:extLst>
+              <a:ext uri="{FF2B5EF4-FFF2-40B4-BE49-F238E27FC236}">
+                <a16:creationId xmlns:a16="http://schemas.microsoft.com/office/drawing/2014/main" id="{02DA4FF1-2D7F-4A19-9674-67D3214AD8C0}"/>
+              </a:ext>
+            </a:extLst>
+          </p:cNvPr>
+          <p:cNvCxnSpPr/>
+          <p:nvPr/>
+        </p:nvCxnSpPr>
+        <p:spPr>
+          <a:xfrm>
+            <a:off x="943472" y="3301465"/>
+            <a:ext cx="2057400" cy="0"/>
+          </a:xfrm>
+          <a:prstGeom prst="line">
+            <a:avLst/>
+          </a:prstGeom>
+          <a:ln w="12700"/>
+        </p:spPr>
+        <p:style>
+          <a:lnRef idx="1">
+            <a:schemeClr val="accent1"/>
+          </a:lnRef>
+          <a:fillRef idx="0">
+            <a:schemeClr val="accent1"/>
+          </a:fillRef>
+          <a:effectRef idx="0">
+            <a:schemeClr val="accent1"/>
+          </a:effectRef>
+          <a:fontRef idx="minor">
+            <a:schemeClr val="tx1"/>
+          </a:fontRef>
+        </p:style>
+      </p:cxnSp>
+      <p:cxnSp>
+        <p:nvCxnSpPr>
+          <p:cNvPr id="19" name="Straight Connector 18">
+            <a:extLst>
+              <a:ext uri="{FF2B5EF4-FFF2-40B4-BE49-F238E27FC236}">
+                <a16:creationId xmlns:a16="http://schemas.microsoft.com/office/drawing/2014/main" id="{0D2F3708-3C57-46BC-943E-E900008E586D}"/>
+              </a:ext>
+            </a:extLst>
+          </p:cNvPr>
+          <p:cNvCxnSpPr/>
+          <p:nvPr/>
+        </p:nvCxnSpPr>
+        <p:spPr>
+          <a:xfrm>
+            <a:off x="943472" y="3843332"/>
+            <a:ext cx="2057400" cy="0"/>
+          </a:xfrm>
+          <a:prstGeom prst="line">
+            <a:avLst/>
+          </a:prstGeom>
+          <a:ln w="12700"/>
+        </p:spPr>
+        <p:style>
+          <a:lnRef idx="1">
+            <a:schemeClr val="accent1"/>
+          </a:lnRef>
+          <a:fillRef idx="0">
+            <a:schemeClr val="accent1"/>
+          </a:fillRef>
+          <a:effectRef idx="0">
+            <a:schemeClr val="accent1"/>
+          </a:effectRef>
+          <a:fontRef idx="minor">
+            <a:schemeClr val="tx1"/>
+          </a:fontRef>
+        </p:style>
+      </p:cxnSp>
+      <p:sp>
+        <p:nvSpPr>
+          <p:cNvPr id="20" name="Rectangle 19">
+            <a:extLst>
+              <a:ext uri="{FF2B5EF4-FFF2-40B4-BE49-F238E27FC236}">
+                <a16:creationId xmlns:a16="http://schemas.microsoft.com/office/drawing/2014/main" id="{33FA23E7-D72F-4D63-94B0-51BFD4AD7C1A}"/>
+              </a:ext>
+            </a:extLst>
+          </p:cNvPr>
+          <p:cNvSpPr/>
+          <p:nvPr/>
+        </p:nvSpPr>
+        <p:spPr>
+          <a:xfrm>
+            <a:off x="0" y="6267450"/>
+            <a:ext cx="12192000" cy="571500"/>
+          </a:xfrm>
+          <a:prstGeom prst="rect">
+            <a:avLst/>
+          </a:prstGeom>
+        </p:spPr>
+        <p:style>
+          <a:lnRef idx="2">
+            <a:schemeClr val="dk1">
+              <a:shade val="50000"/>
+            </a:schemeClr>
+          </a:lnRef>
+          <a:fillRef idx="1">
+            <a:schemeClr val="dk1"/>
+          </a:fillRef>
+          <a:effectRef idx="0">
+            <a:schemeClr val="dk1"/>
+          </a:effectRef>
+          <a:fontRef idx="minor">
+            <a:schemeClr val="lt1"/>
+          </a:fontRef>
+        </p:style>
+        <p:txBody>
+          <a:bodyPr rtlCol="0" anchor="ctr"/>
+          <a:lstStyle/>
+          <a:p>
+            <a:pPr algn="ctr"/>
+            <a:r>
+              <a:rPr lang="en-US" sz="2800" dirty="0">
+                <a:latin typeface="AR DELANEY" panose="02000000000000000000" pitchFamily="2" charset="0"/>
+              </a:rPr>
+              <a:t>PPLpleaser.com</a:t>
+            </a:r>
+          </a:p>
+        </p:txBody>
+      </p:sp>
+    </p:spTree>
+    <p:extLst>
+      <p:ext uri="{BB962C8B-B14F-4D97-AF65-F5344CB8AC3E}">
+        <p14:creationId xmlns:p14="http://schemas.microsoft.com/office/powerpoint/2010/main" val="771016331"/>
+      </p:ext>
+    </p:extLst>
+  </p:cSld>
+  <p:clrMapOvr>
+    <a:masterClrMapping/>
+  </p:clrMapOvr>
+</p:sld>
+</file>
+
+<file path=ppt/slides/slide12.xml><?xml version="1.0" encoding="utf-8"?>
+<p:sld xmlns:a="http://schemas.openxmlformats.org/drawingml/2006/main" xmlns:r="http://schemas.openxmlformats.org/officeDocument/2006/relationships" xmlns:p="http://schemas.openxmlformats.org/presentationml/2006/main">
+  <p:cSld>
+    <p:spTree>
+      <p:nvGrpSpPr>
+        <p:cNvPr id="1" name=""/>
+        <p:cNvGrpSpPr/>
+        <p:nvPr/>
+      </p:nvGrpSpPr>
+      <p:grpSpPr>
+        <a:xfrm>
+          <a:off x="0" y="0"/>
+          <a:ext cx="0" cy="0"/>
+          <a:chOff x="0" y="0"/>
+          <a:chExt cx="0" cy="0"/>
+        </a:xfrm>
+      </p:grpSpPr>
+      <p:sp>
+        <p:nvSpPr>
+          <p:cNvPr id="21" name="Isosceles Triangle 20">
+            <a:extLst>
+              <a:ext uri="{FF2B5EF4-FFF2-40B4-BE49-F238E27FC236}">
+                <a16:creationId xmlns:a16="http://schemas.microsoft.com/office/drawing/2014/main" id="{C1ED0A04-5731-4599-B0CA-9AED19C20B21}"/>
+              </a:ext>
+            </a:extLst>
+          </p:cNvPr>
+          <p:cNvSpPr/>
+          <p:nvPr/>
+        </p:nvSpPr>
+        <p:spPr>
+          <a:xfrm>
+            <a:off x="5210175" y="5357061"/>
+            <a:ext cx="1781175" cy="1019175"/>
+          </a:xfrm>
+          <a:prstGeom prst="triangle">
+            <a:avLst/>
+          </a:prstGeom>
+        </p:spPr>
+        <p:style>
+          <a:lnRef idx="2">
+            <a:schemeClr val="dk1">
+              <a:shade val="50000"/>
+            </a:schemeClr>
+          </a:lnRef>
+          <a:fillRef idx="1">
+            <a:schemeClr val="dk1"/>
+          </a:fillRef>
+          <a:effectRef idx="0">
+            <a:schemeClr val="dk1"/>
+          </a:effectRef>
+          <a:fontRef idx="minor">
+            <a:schemeClr val="lt1"/>
+          </a:fontRef>
+        </p:style>
+        <p:txBody>
+          <a:bodyPr rtlCol="0" anchor="ctr"/>
+          <a:lstStyle/>
+          <a:p>
+            <a:pPr algn="ctr"/>
+            <a:endParaRPr lang="en-US"/>
+          </a:p>
+        </p:txBody>
+      </p:sp>
+      <p:sp>
+        <p:nvSpPr>
+          <p:cNvPr id="2" name="Title 1">
+            <a:extLst>
+              <a:ext uri="{FF2B5EF4-FFF2-40B4-BE49-F238E27FC236}">
+                <a16:creationId xmlns:a16="http://schemas.microsoft.com/office/drawing/2014/main" id="{CE7D1F5A-C74C-4522-9EA2-4BE11F79232C}"/>
+              </a:ext>
+            </a:extLst>
+          </p:cNvPr>
+          <p:cNvSpPr>
+            <a:spLocks noGrp="1"/>
+          </p:cNvSpPr>
+          <p:nvPr>
+            <p:ph type="title"/>
+          </p:nvPr>
+        </p:nvSpPr>
+        <p:spPr/>
+        <p:txBody>
+          <a:bodyPr/>
+          <a:lstStyle/>
+          <a:p>
+            <a:r>
+              <a:rPr lang="en-US" b="1" dirty="0"/>
+              <a:t>SIGN IN </a:t>
+            </a:r>
+            <a:r>
+              <a:rPr lang="en-US" dirty="0"/>
+              <a:t>Page (</a:t>
+            </a:r>
+            <a:r>
+              <a:rPr lang="en-US" dirty="0">
+                <a:solidFill>
+                  <a:srgbClr val="FF0000"/>
+                </a:solidFill>
+              </a:rPr>
+              <a:t>Top version</a:t>
+            </a:r>
+            <a:r>
+              <a:rPr lang="en-US" dirty="0"/>
+              <a:t>)</a:t>
+            </a:r>
+          </a:p>
+        </p:txBody>
+      </p:sp>
+      <p:sp>
+        <p:nvSpPr>
+          <p:cNvPr id="9" name="Rectangle 8">
+            <a:extLst>
+              <a:ext uri="{FF2B5EF4-FFF2-40B4-BE49-F238E27FC236}">
+                <a16:creationId xmlns:a16="http://schemas.microsoft.com/office/drawing/2014/main" id="{0EE6495E-1FFE-446F-A3EA-A1933561AFE8}"/>
+              </a:ext>
+            </a:extLst>
+          </p:cNvPr>
+          <p:cNvSpPr/>
+          <p:nvPr/>
+        </p:nvSpPr>
+        <p:spPr>
+          <a:xfrm>
+            <a:off x="838200" y="1457324"/>
+            <a:ext cx="10515601" cy="4391025"/>
+          </a:xfrm>
+          <a:prstGeom prst="rect">
+            <a:avLst/>
+          </a:prstGeom>
+          <a:solidFill>
+            <a:schemeClr val="bg1">
+              <a:lumMod val="85000"/>
+            </a:schemeClr>
+          </a:solidFill>
+          <a:ln w="38100"/>
+        </p:spPr>
+        <p:style>
+          <a:lnRef idx="2">
+            <a:schemeClr val="dk1"/>
+          </a:lnRef>
+          <a:fillRef idx="1">
+            <a:schemeClr val="lt1"/>
+          </a:fillRef>
+          <a:effectRef idx="0">
+            <a:schemeClr val="dk1"/>
+          </a:effectRef>
+          <a:fontRef idx="minor">
+            <a:schemeClr val="dk1"/>
+          </a:fontRef>
+        </p:style>
+        <p:txBody>
+          <a:bodyPr rtlCol="0" anchor="t"/>
+          <a:lstStyle/>
+          <a:p>
+            <a:pPr algn="ctr"/>
+            <a:endParaRPr lang="en-US" dirty="0"/>
+          </a:p>
+        </p:txBody>
+      </p:sp>
+      <p:sp>
+        <p:nvSpPr>
+          <p:cNvPr id="3" name="Rectangle 2">
+            <a:extLst>
+              <a:ext uri="{FF2B5EF4-FFF2-40B4-BE49-F238E27FC236}">
+                <a16:creationId xmlns:a16="http://schemas.microsoft.com/office/drawing/2014/main" id="{78F3DD19-8C6E-49E2-A900-82F3D1607801}"/>
+              </a:ext>
+            </a:extLst>
+          </p:cNvPr>
+          <p:cNvSpPr/>
+          <p:nvPr/>
+        </p:nvSpPr>
+        <p:spPr>
+          <a:xfrm>
+            <a:off x="838200" y="1457325"/>
+            <a:ext cx="10515600" cy="1112500"/>
+          </a:xfrm>
+          <a:prstGeom prst="rect">
+            <a:avLst/>
+          </a:prstGeom>
+          <a:solidFill>
+            <a:srgbClr val="192C4F"/>
+          </a:solidFill>
+        </p:spPr>
+        <p:style>
+          <a:lnRef idx="2">
+            <a:schemeClr val="accent1">
+              <a:shade val="50000"/>
+            </a:schemeClr>
+          </a:lnRef>
+          <a:fillRef idx="1">
+            <a:schemeClr val="accent1"/>
+          </a:fillRef>
+          <a:effectRef idx="0">
+            <a:schemeClr val="accent1"/>
+          </a:effectRef>
+          <a:fontRef idx="minor">
+            <a:schemeClr val="lt1"/>
+          </a:fontRef>
+        </p:style>
+        <p:txBody>
+          <a:bodyPr rtlCol="0" anchor="ctr"/>
+          <a:lstStyle/>
+          <a:p>
+            <a:pPr algn="ctr"/>
+            <a:r>
+              <a:rPr lang="en-US" sz="1600" dirty="0"/>
+              <a:t>User </a:t>
+            </a:r>
+            <a:r>
+              <a:rPr lang="en-US" sz="1600" dirty="0">
+                <a:solidFill>
+                  <a:schemeClr val="accent1">
+                    <a:lumMod val="50000"/>
+                  </a:schemeClr>
+                </a:solidFill>
+              </a:rPr>
+              <a:t>_____________</a:t>
+            </a:r>
+            <a:r>
+              <a:rPr lang="en-US" sz="1600" dirty="0"/>
+              <a:t> Password</a:t>
+            </a:r>
+            <a:r>
+              <a:rPr lang="en-US" sz="1600" dirty="0">
+                <a:solidFill>
+                  <a:schemeClr val="accent1">
+                    <a:lumMod val="50000"/>
+                  </a:schemeClr>
+                </a:solidFill>
+              </a:rPr>
+              <a:t>_____________</a:t>
+            </a:r>
+            <a:br>
+              <a:rPr lang="en-US" sz="1600" dirty="0"/>
+            </a:br>
+            <a:br>
+              <a:rPr lang="en-US" sz="1100" dirty="0"/>
+            </a:br>
+            <a:r>
+              <a:rPr lang="en-US" sz="1100" dirty="0"/>
+              <a:t>Trouble logging in?</a:t>
+            </a:r>
+          </a:p>
+        </p:txBody>
+      </p:sp>
+      <p:cxnSp>
+        <p:nvCxnSpPr>
+          <p:cNvPr id="6" name="Straight Connector 5">
+            <a:extLst>
+              <a:ext uri="{FF2B5EF4-FFF2-40B4-BE49-F238E27FC236}">
+                <a16:creationId xmlns:a16="http://schemas.microsoft.com/office/drawing/2014/main" id="{02DA4FF1-2D7F-4A19-9674-67D3214AD8C0}"/>
+              </a:ext>
+            </a:extLst>
+          </p:cNvPr>
+          <p:cNvCxnSpPr/>
+          <p:nvPr/>
+        </p:nvCxnSpPr>
+        <p:spPr>
+          <a:xfrm>
+            <a:off x="4162425" y="1953148"/>
+            <a:ext cx="1600200" cy="0"/>
+          </a:xfrm>
+          <a:prstGeom prst="line">
+            <a:avLst/>
+          </a:prstGeom>
+          <a:ln w="12700"/>
+        </p:spPr>
+        <p:style>
+          <a:lnRef idx="1">
+            <a:schemeClr val="accent1"/>
+          </a:lnRef>
+          <a:fillRef idx="0">
+            <a:schemeClr val="accent1"/>
+          </a:fillRef>
+          <a:effectRef idx="0">
+            <a:schemeClr val="accent1"/>
+          </a:effectRef>
+          <a:fontRef idx="minor">
+            <a:schemeClr val="tx1"/>
+          </a:fontRef>
+        </p:style>
+      </p:cxnSp>
+      <p:sp>
+        <p:nvSpPr>
+          <p:cNvPr id="20" name="Rectangle 19">
+            <a:extLst>
+              <a:ext uri="{FF2B5EF4-FFF2-40B4-BE49-F238E27FC236}">
+                <a16:creationId xmlns:a16="http://schemas.microsoft.com/office/drawing/2014/main" id="{33FA23E7-D72F-4D63-94B0-51BFD4AD7C1A}"/>
+              </a:ext>
+            </a:extLst>
+          </p:cNvPr>
+          <p:cNvSpPr/>
+          <p:nvPr/>
+        </p:nvSpPr>
+        <p:spPr>
+          <a:xfrm>
+            <a:off x="0" y="6267450"/>
+            <a:ext cx="12192000" cy="571500"/>
+          </a:xfrm>
+          <a:prstGeom prst="rect">
+            <a:avLst/>
+          </a:prstGeom>
+        </p:spPr>
+        <p:style>
+          <a:lnRef idx="2">
+            <a:schemeClr val="dk1">
+              <a:shade val="50000"/>
+            </a:schemeClr>
+          </a:lnRef>
+          <a:fillRef idx="1">
+            <a:schemeClr val="dk1"/>
+          </a:fillRef>
+          <a:effectRef idx="0">
+            <a:schemeClr val="dk1"/>
+          </a:effectRef>
+          <a:fontRef idx="minor">
+            <a:schemeClr val="lt1"/>
+          </a:fontRef>
+        </p:style>
+        <p:txBody>
+          <a:bodyPr rtlCol="0" anchor="ctr"/>
+          <a:lstStyle/>
+          <a:p>
+            <a:pPr algn="ctr"/>
+            <a:r>
+              <a:rPr lang="en-US" sz="2800" dirty="0">
+                <a:latin typeface="AR DELANEY" panose="02000000000000000000" pitchFamily="2" charset="0"/>
+              </a:rPr>
+              <a:t>PPLpleaser.com</a:t>
+            </a:r>
+          </a:p>
+        </p:txBody>
+      </p:sp>
+      <p:sp>
+        <p:nvSpPr>
+          <p:cNvPr id="10" name="Rectangle 9">
+            <a:extLst>
+              <a:ext uri="{FF2B5EF4-FFF2-40B4-BE49-F238E27FC236}">
+                <a16:creationId xmlns:a16="http://schemas.microsoft.com/office/drawing/2014/main" id="{3C560313-DD10-4CD9-9834-BE0881C64A19}"/>
+              </a:ext>
+            </a:extLst>
+          </p:cNvPr>
+          <p:cNvSpPr/>
+          <p:nvPr/>
+        </p:nvSpPr>
+        <p:spPr>
+          <a:xfrm>
+            <a:off x="2352674" y="2988926"/>
+            <a:ext cx="2286000" cy="2793807"/>
+          </a:xfrm>
+          <a:prstGeom prst="rect">
+            <a:avLst/>
+          </a:prstGeom>
+          <a:ln>
+            <a:noFill/>
+          </a:ln>
+          <a:effectLst>
+            <a:outerShdw blurRad="107950" dist="12700" dir="5400000" algn="ctr">
+              <a:srgbClr val="000000"/>
+            </a:outerShdw>
+          </a:effectLst>
+          <a:scene3d>
+            <a:camera prst="orthographicFront">
+              <a:rot lat="0" lon="0" rev="0"/>
+            </a:camera>
+            <a:lightRig rig="soft" dir="t">
+              <a:rot lat="0" lon="0" rev="0"/>
+            </a:lightRig>
+          </a:scene3d>
+          <a:sp3d contourW="44450" prstMaterial="matte">
+            <a:bevelT w="63500" h="63500" prst="artDeco"/>
+            <a:contourClr>
+              <a:srgbClr val="FFFFFF"/>
+            </a:contourClr>
+          </a:sp3d>
+        </p:spPr>
+        <p:style>
+          <a:lnRef idx="2">
+            <a:schemeClr val="accent1">
+              <a:shade val="50000"/>
+            </a:schemeClr>
+          </a:lnRef>
+          <a:fillRef idx="1">
+            <a:schemeClr val="accent1"/>
+          </a:fillRef>
+          <a:effectRef idx="0">
+            <a:schemeClr val="accent1"/>
+          </a:effectRef>
+          <a:fontRef idx="minor">
+            <a:schemeClr val="lt1"/>
+          </a:fontRef>
+        </p:style>
+        <p:txBody>
+          <a:bodyPr rtlCol="0" anchor="ctr"/>
+          <a:lstStyle/>
+          <a:p>
+            <a:pPr algn="ctr"/>
+            <a:r>
+              <a:rPr lang="en-US" sz="2200" dirty="0"/>
+              <a:t>SODA FLAVORS</a:t>
+            </a:r>
+          </a:p>
+        </p:txBody>
+      </p:sp>
+      <p:sp>
+        <p:nvSpPr>
+          <p:cNvPr id="11" name="Rectangle 10">
+            <a:extLst>
+              <a:ext uri="{FF2B5EF4-FFF2-40B4-BE49-F238E27FC236}">
+                <a16:creationId xmlns:a16="http://schemas.microsoft.com/office/drawing/2014/main" id="{3965F2FB-F5EB-46B7-90BC-F9804D3FFC8B}"/>
+              </a:ext>
+            </a:extLst>
+          </p:cNvPr>
+          <p:cNvSpPr/>
+          <p:nvPr/>
+        </p:nvSpPr>
+        <p:spPr>
+          <a:xfrm>
+            <a:off x="4953000" y="2988926"/>
+            <a:ext cx="2286000" cy="2793807"/>
+          </a:xfrm>
+          <a:prstGeom prst="rect">
+            <a:avLst/>
+          </a:prstGeom>
+          <a:ln>
+            <a:noFill/>
+          </a:ln>
+          <a:effectLst>
+            <a:outerShdw blurRad="107950" dist="12700" dir="5400000" algn="ctr">
+              <a:srgbClr val="000000"/>
+            </a:outerShdw>
+          </a:effectLst>
+          <a:scene3d>
+            <a:camera prst="orthographicFront">
+              <a:rot lat="0" lon="0" rev="0"/>
+            </a:camera>
+            <a:lightRig rig="soft" dir="t">
+              <a:rot lat="0" lon="0" rev="0"/>
+            </a:lightRig>
+          </a:scene3d>
+          <a:sp3d contourW="44450" prstMaterial="matte">
+            <a:bevelT w="63500" h="63500" prst="artDeco"/>
+            <a:contourClr>
+              <a:srgbClr val="FFFFFF"/>
+            </a:contourClr>
+          </a:sp3d>
+        </p:spPr>
+        <p:style>
+          <a:lnRef idx="2">
+            <a:schemeClr val="accent1">
+              <a:shade val="50000"/>
+            </a:schemeClr>
+          </a:lnRef>
+          <a:fillRef idx="1">
+            <a:schemeClr val="accent1"/>
+          </a:fillRef>
+          <a:effectRef idx="0">
+            <a:schemeClr val="accent1"/>
+          </a:effectRef>
+          <a:fontRef idx="minor">
+            <a:schemeClr val="lt1"/>
+          </a:fontRef>
+        </p:style>
+        <p:txBody>
+          <a:bodyPr rtlCol="0" anchor="ctr"/>
+          <a:lstStyle/>
+          <a:p>
+            <a:pPr algn="ctr"/>
+            <a:r>
+              <a:rPr lang="en-US" sz="2200" dirty="0" err="1"/>
+              <a:t>GoT</a:t>
+            </a:r>
+            <a:r>
+              <a:rPr lang="en-US" sz="2200" dirty="0"/>
+              <a:t> CHARACTERS</a:t>
+            </a:r>
+          </a:p>
+        </p:txBody>
+      </p:sp>
+      <p:sp>
+        <p:nvSpPr>
+          <p:cNvPr id="12" name="Rectangle 11">
+            <a:extLst>
+              <a:ext uri="{FF2B5EF4-FFF2-40B4-BE49-F238E27FC236}">
+                <a16:creationId xmlns:a16="http://schemas.microsoft.com/office/drawing/2014/main" id="{D7A96DB2-2A3A-4EE9-B477-71BD0022C22F}"/>
+              </a:ext>
+            </a:extLst>
+          </p:cNvPr>
+          <p:cNvSpPr/>
+          <p:nvPr/>
+        </p:nvSpPr>
+        <p:spPr>
+          <a:xfrm>
+            <a:off x="7553326" y="2988926"/>
+            <a:ext cx="2286000" cy="2793807"/>
+          </a:xfrm>
+          <a:prstGeom prst="rect">
+            <a:avLst/>
+          </a:prstGeom>
+          <a:ln>
+            <a:noFill/>
+          </a:ln>
+          <a:effectLst>
+            <a:outerShdw blurRad="107950" dist="12700" dir="5400000" algn="ctr">
+              <a:srgbClr val="000000"/>
+            </a:outerShdw>
+          </a:effectLst>
+          <a:scene3d>
+            <a:camera prst="orthographicFront">
+              <a:rot lat="0" lon="0" rev="0"/>
+            </a:camera>
+            <a:lightRig rig="soft" dir="t">
+              <a:rot lat="0" lon="0" rev="0"/>
+            </a:lightRig>
+          </a:scene3d>
+          <a:sp3d contourW="44450" prstMaterial="matte">
+            <a:bevelT w="63500" h="63500" prst="artDeco"/>
+            <a:contourClr>
+              <a:srgbClr val="FFFFFF"/>
+            </a:contourClr>
+          </a:sp3d>
+        </p:spPr>
+        <p:style>
+          <a:lnRef idx="2">
+            <a:schemeClr val="accent1">
+              <a:shade val="50000"/>
+            </a:schemeClr>
+          </a:lnRef>
+          <a:fillRef idx="1">
+            <a:schemeClr val="accent1"/>
+          </a:fillRef>
+          <a:effectRef idx="0">
+            <a:schemeClr val="accent1"/>
+          </a:effectRef>
+          <a:fontRef idx="minor">
+            <a:schemeClr val="lt1"/>
+          </a:fontRef>
+        </p:style>
+        <p:txBody>
+          <a:bodyPr rtlCol="0" anchor="ctr"/>
+          <a:lstStyle/>
+          <a:p>
+            <a:pPr algn="ctr"/>
+            <a:r>
+              <a:rPr lang="en-US" sz="2200" dirty="0"/>
+              <a:t>DORITO FLAVORS</a:t>
+            </a:r>
+          </a:p>
+        </p:txBody>
+      </p:sp>
+      <p:cxnSp>
+        <p:nvCxnSpPr>
+          <p:cNvPr id="22" name="Straight Connector 21">
+            <a:extLst>
+              <a:ext uri="{FF2B5EF4-FFF2-40B4-BE49-F238E27FC236}">
+                <a16:creationId xmlns:a16="http://schemas.microsoft.com/office/drawing/2014/main" id="{07896B09-AA0A-476C-AF86-935CCD49EF3A}"/>
+              </a:ext>
+            </a:extLst>
+          </p:cNvPr>
+          <p:cNvCxnSpPr>
+            <a:cxnSpLocks/>
+          </p:cNvCxnSpPr>
+          <p:nvPr/>
+        </p:nvCxnSpPr>
+        <p:spPr>
+          <a:xfrm>
+            <a:off x="5953126" y="1953148"/>
+            <a:ext cx="1981199" cy="0"/>
+          </a:xfrm>
+          <a:prstGeom prst="line">
+            <a:avLst/>
+          </a:prstGeom>
+          <a:ln w="12700"/>
+        </p:spPr>
+        <p:style>
+          <a:lnRef idx="1">
+            <a:schemeClr val="accent1"/>
+          </a:lnRef>
+          <a:fillRef idx="0">
+            <a:schemeClr val="accent1"/>
+          </a:fillRef>
+          <a:effectRef idx="0">
+            <a:schemeClr val="accent1"/>
+          </a:effectRef>
+          <a:fontRef idx="minor">
+            <a:schemeClr val="tx1"/>
+          </a:fontRef>
+        </p:style>
+      </p:cxnSp>
+      <p:sp>
+        <p:nvSpPr>
+          <p:cNvPr id="15" name="Rectangle 14">
+            <a:extLst>
+              <a:ext uri="{FF2B5EF4-FFF2-40B4-BE49-F238E27FC236}">
+                <a16:creationId xmlns:a16="http://schemas.microsoft.com/office/drawing/2014/main" id="{9AB6ACAF-E644-4D34-9E15-E75F68C9257D}"/>
+              </a:ext>
+            </a:extLst>
+          </p:cNvPr>
+          <p:cNvSpPr/>
+          <p:nvPr/>
+        </p:nvSpPr>
+        <p:spPr>
+          <a:xfrm>
+            <a:off x="838199" y="1457323"/>
+            <a:ext cx="2286000" cy="4325409"/>
+          </a:xfrm>
+          <a:prstGeom prst="rect">
+            <a:avLst/>
+          </a:prstGeom>
+          <a:solidFill>
+            <a:schemeClr val="tx1">
+              <a:lumMod val="85000"/>
+              <a:lumOff val="15000"/>
+            </a:schemeClr>
+          </a:solidFill>
+        </p:spPr>
+        <p:style>
+          <a:lnRef idx="2">
+            <a:schemeClr val="accent1">
+              <a:shade val="50000"/>
+            </a:schemeClr>
+          </a:lnRef>
+          <a:fillRef idx="1">
+            <a:schemeClr val="accent1"/>
+          </a:fillRef>
+          <a:effectRef idx="0">
+            <a:schemeClr val="accent1"/>
+          </a:effectRef>
+          <a:fontRef idx="minor">
+            <a:schemeClr val="lt1"/>
+          </a:fontRef>
+        </p:style>
+        <p:txBody>
+          <a:bodyPr rtlCol="0" anchor="ctr"/>
+          <a:lstStyle/>
+          <a:p>
+            <a:pPr algn="ctr"/>
+            <a:r>
+              <a:rPr lang="en-US" sz="1100" dirty="0"/>
+              <a:t>CATEGORIES (A to Z)</a:t>
+            </a:r>
+          </a:p>
+        </p:txBody>
+      </p:sp>
+    </p:spTree>
+    <p:extLst>
+      <p:ext uri="{BB962C8B-B14F-4D97-AF65-F5344CB8AC3E}">
+        <p14:creationId xmlns:p14="http://schemas.microsoft.com/office/powerpoint/2010/main" val="2062874010"/>
+      </p:ext>
+    </p:extLst>
+  </p:cSld>
+  <p:clrMapOvr>
+    <a:masterClrMapping/>
+  </p:clrMapOvr>
+</p:sld>
+</file>
+
+<file path=ppt/slides/slide13.xml><?xml version="1.0" encoding="utf-8"?>
+<p:sld xmlns:a="http://schemas.openxmlformats.org/drawingml/2006/main" xmlns:r="http://schemas.openxmlformats.org/officeDocument/2006/relationships" xmlns:p="http://schemas.openxmlformats.org/presentationml/2006/main">
+  <p:cSld>
+    <p:spTree>
+      <p:nvGrpSpPr>
+        <p:cNvPr id="1" name=""/>
+        <p:cNvGrpSpPr/>
+        <p:nvPr/>
+      </p:nvGrpSpPr>
+      <p:grpSpPr>
+        <a:xfrm>
+          <a:off x="0" y="0"/>
+          <a:ext cx="0" cy="0"/>
+          <a:chOff x="0" y="0"/>
+          <a:chExt cx="0" cy="0"/>
+        </a:xfrm>
+      </p:grpSpPr>
+      <p:sp>
+        <p:nvSpPr>
+          <p:cNvPr id="20" name="Isosceles Triangle 19">
+            <a:extLst>
+              <a:ext uri="{FF2B5EF4-FFF2-40B4-BE49-F238E27FC236}">
+                <a16:creationId xmlns:a16="http://schemas.microsoft.com/office/drawing/2014/main" id="{E14EA78F-8BE3-46A3-A2ED-AEC938897423}"/>
+              </a:ext>
+            </a:extLst>
+          </p:cNvPr>
+          <p:cNvSpPr/>
+          <p:nvPr/>
+        </p:nvSpPr>
+        <p:spPr>
+          <a:xfrm>
+            <a:off x="5210175" y="5357061"/>
+            <a:ext cx="1781175" cy="1019175"/>
+          </a:xfrm>
+          <a:prstGeom prst="triangle">
+            <a:avLst/>
+          </a:prstGeom>
+        </p:spPr>
+        <p:style>
+          <a:lnRef idx="2">
+            <a:schemeClr val="dk1">
+              <a:shade val="50000"/>
+            </a:schemeClr>
+          </a:lnRef>
+          <a:fillRef idx="1">
+            <a:schemeClr val="dk1"/>
+          </a:fillRef>
+          <a:effectRef idx="0">
+            <a:schemeClr val="dk1"/>
+          </a:effectRef>
+          <a:fontRef idx="minor">
+            <a:schemeClr val="lt1"/>
+          </a:fontRef>
+        </p:style>
+        <p:txBody>
+          <a:bodyPr rtlCol="0" anchor="ctr"/>
+          <a:lstStyle/>
+          <a:p>
+            <a:pPr algn="ctr"/>
+            <a:endParaRPr lang="en-US"/>
+          </a:p>
+        </p:txBody>
+      </p:sp>
+      <p:sp>
+        <p:nvSpPr>
+          <p:cNvPr id="2" name="Title 1">
+            <a:extLst>
+              <a:ext uri="{FF2B5EF4-FFF2-40B4-BE49-F238E27FC236}">
+                <a16:creationId xmlns:a16="http://schemas.microsoft.com/office/drawing/2014/main" id="{CE7D1F5A-C74C-4522-9EA2-4BE11F79232C}"/>
+              </a:ext>
+            </a:extLst>
+          </p:cNvPr>
+          <p:cNvSpPr>
+            <a:spLocks noGrp="1"/>
+          </p:cNvSpPr>
+          <p:nvPr>
+            <p:ph type="title"/>
+          </p:nvPr>
+        </p:nvSpPr>
+        <p:spPr/>
+        <p:txBody>
+          <a:bodyPr/>
+          <a:lstStyle/>
+          <a:p>
+            <a:r>
+              <a:rPr lang="en-US" b="1" dirty="0"/>
+              <a:t>SIGN IN </a:t>
+            </a:r>
+            <a:r>
+              <a:rPr lang="en-US" dirty="0"/>
+              <a:t>Page (</a:t>
+            </a:r>
+            <a:r>
+              <a:rPr lang="en-US" dirty="0">
+                <a:solidFill>
+                  <a:srgbClr val="FF0000"/>
+                </a:solidFill>
+              </a:rPr>
+              <a:t>Modal version</a:t>
+            </a:r>
+            <a:r>
+              <a:rPr lang="en-US" dirty="0"/>
+              <a:t>)</a:t>
+            </a:r>
+          </a:p>
+        </p:txBody>
+      </p:sp>
+      <p:sp>
+        <p:nvSpPr>
+          <p:cNvPr id="9" name="Rectangle 8">
+            <a:extLst>
+              <a:ext uri="{FF2B5EF4-FFF2-40B4-BE49-F238E27FC236}">
+                <a16:creationId xmlns:a16="http://schemas.microsoft.com/office/drawing/2014/main" id="{0EE6495E-1FFE-446F-A3EA-A1933561AFE8}"/>
+              </a:ext>
+            </a:extLst>
+          </p:cNvPr>
+          <p:cNvSpPr/>
+          <p:nvPr/>
+        </p:nvSpPr>
+        <p:spPr>
+          <a:xfrm>
+            <a:off x="838200" y="1457324"/>
+            <a:ext cx="10515601" cy="4391025"/>
+          </a:xfrm>
+          <a:prstGeom prst="rect">
+            <a:avLst/>
+          </a:prstGeom>
+          <a:solidFill>
+            <a:schemeClr val="bg1">
+              <a:lumMod val="85000"/>
+            </a:schemeClr>
+          </a:solidFill>
+          <a:ln w="38100"/>
+        </p:spPr>
+        <p:style>
+          <a:lnRef idx="2">
+            <a:schemeClr val="dk1"/>
+          </a:lnRef>
+          <a:fillRef idx="1">
+            <a:schemeClr val="lt1"/>
+          </a:fillRef>
+          <a:effectRef idx="0">
+            <a:schemeClr val="dk1"/>
+          </a:effectRef>
+          <a:fontRef idx="minor">
+            <a:schemeClr val="dk1"/>
+          </a:fontRef>
+        </p:style>
+        <p:txBody>
+          <a:bodyPr rtlCol="0" anchor="t"/>
+          <a:lstStyle/>
+          <a:p>
+            <a:pPr algn="ctr"/>
+            <a:endParaRPr lang="en-US" dirty="0"/>
+          </a:p>
+        </p:txBody>
+      </p:sp>
+      <p:sp>
+        <p:nvSpPr>
+          <p:cNvPr id="10" name="Rectangle 9">
+            <a:extLst>
+              <a:ext uri="{FF2B5EF4-FFF2-40B4-BE49-F238E27FC236}">
+                <a16:creationId xmlns:a16="http://schemas.microsoft.com/office/drawing/2014/main" id="{3C560313-DD10-4CD9-9834-BE0881C64A19}"/>
+              </a:ext>
+            </a:extLst>
+          </p:cNvPr>
+          <p:cNvSpPr/>
+          <p:nvPr/>
+        </p:nvSpPr>
+        <p:spPr>
+          <a:xfrm>
+            <a:off x="2352674" y="2598820"/>
+            <a:ext cx="2286000" cy="2550695"/>
+          </a:xfrm>
+          <a:prstGeom prst="rect">
+            <a:avLst/>
+          </a:prstGeom>
+          <a:ln>
+            <a:noFill/>
+          </a:ln>
+          <a:effectLst>
+            <a:outerShdw blurRad="107950" dist="12700" dir="5400000" algn="ctr">
+              <a:srgbClr val="000000"/>
+            </a:outerShdw>
+          </a:effectLst>
+          <a:scene3d>
+            <a:camera prst="orthographicFront">
+              <a:rot lat="0" lon="0" rev="0"/>
+            </a:camera>
+            <a:lightRig rig="soft" dir="t">
+              <a:rot lat="0" lon="0" rev="0"/>
+            </a:lightRig>
+          </a:scene3d>
+          <a:sp3d contourW="44450" prstMaterial="matte">
+            <a:bevelT w="63500" h="63500" prst="artDeco"/>
+            <a:contourClr>
+              <a:srgbClr val="FFFFFF"/>
+            </a:contourClr>
+          </a:sp3d>
+        </p:spPr>
+        <p:style>
+          <a:lnRef idx="2">
+            <a:schemeClr val="accent1">
+              <a:shade val="50000"/>
+            </a:schemeClr>
+          </a:lnRef>
+          <a:fillRef idx="1">
+            <a:schemeClr val="accent1"/>
+          </a:fillRef>
+          <a:effectRef idx="0">
+            <a:schemeClr val="accent1"/>
+          </a:effectRef>
+          <a:fontRef idx="minor">
+            <a:schemeClr val="lt1"/>
+          </a:fontRef>
+        </p:style>
+        <p:txBody>
+          <a:bodyPr rtlCol="0" anchor="ctr"/>
+          <a:lstStyle/>
+          <a:p>
+            <a:pPr algn="ctr"/>
+            <a:r>
+              <a:rPr lang="en-US" sz="2200" dirty="0"/>
+              <a:t>SODA FLAVORS</a:t>
+            </a:r>
+          </a:p>
+        </p:txBody>
+      </p:sp>
+      <p:sp>
+        <p:nvSpPr>
+          <p:cNvPr id="11" name="Rectangle 10">
+            <a:extLst>
+              <a:ext uri="{FF2B5EF4-FFF2-40B4-BE49-F238E27FC236}">
+                <a16:creationId xmlns:a16="http://schemas.microsoft.com/office/drawing/2014/main" id="{3965F2FB-F5EB-46B7-90BC-F9804D3FFC8B}"/>
+              </a:ext>
+            </a:extLst>
+          </p:cNvPr>
+          <p:cNvSpPr/>
+          <p:nvPr/>
+        </p:nvSpPr>
+        <p:spPr>
+          <a:xfrm>
+            <a:off x="4953000" y="2598820"/>
+            <a:ext cx="2286000" cy="2550695"/>
+          </a:xfrm>
+          <a:prstGeom prst="rect">
+            <a:avLst/>
+          </a:prstGeom>
+          <a:ln>
+            <a:noFill/>
+          </a:ln>
+          <a:effectLst>
+            <a:outerShdw blurRad="107950" dist="12700" dir="5400000" algn="ctr">
+              <a:srgbClr val="000000"/>
+            </a:outerShdw>
+          </a:effectLst>
+          <a:scene3d>
+            <a:camera prst="orthographicFront">
+              <a:rot lat="0" lon="0" rev="0"/>
+            </a:camera>
+            <a:lightRig rig="soft" dir="t">
+              <a:rot lat="0" lon="0" rev="0"/>
+            </a:lightRig>
+          </a:scene3d>
+          <a:sp3d contourW="44450" prstMaterial="matte">
+            <a:bevelT w="63500" h="63500" prst="artDeco"/>
+            <a:contourClr>
+              <a:srgbClr val="FFFFFF"/>
+            </a:contourClr>
+          </a:sp3d>
+        </p:spPr>
+        <p:style>
+          <a:lnRef idx="2">
+            <a:schemeClr val="accent1">
+              <a:shade val="50000"/>
+            </a:schemeClr>
+          </a:lnRef>
+          <a:fillRef idx="1">
+            <a:schemeClr val="accent1"/>
+          </a:fillRef>
+          <a:effectRef idx="0">
+            <a:schemeClr val="accent1"/>
+          </a:effectRef>
+          <a:fontRef idx="minor">
+            <a:schemeClr val="lt1"/>
+          </a:fontRef>
+        </p:style>
+        <p:txBody>
+          <a:bodyPr rtlCol="0" anchor="ctr"/>
+          <a:lstStyle/>
+          <a:p>
+            <a:pPr algn="ctr"/>
+            <a:r>
+              <a:rPr lang="en-US" sz="2200" dirty="0" err="1"/>
+              <a:t>GoT</a:t>
+            </a:r>
+            <a:r>
+              <a:rPr lang="en-US" sz="2200" dirty="0"/>
+              <a:t> CHARACTERS</a:t>
+            </a:r>
+          </a:p>
+        </p:txBody>
+      </p:sp>
+      <p:sp>
+        <p:nvSpPr>
+          <p:cNvPr id="12" name="Rectangle 11">
+            <a:extLst>
+              <a:ext uri="{FF2B5EF4-FFF2-40B4-BE49-F238E27FC236}">
+                <a16:creationId xmlns:a16="http://schemas.microsoft.com/office/drawing/2014/main" id="{D7A96DB2-2A3A-4EE9-B477-71BD0022C22F}"/>
+              </a:ext>
+            </a:extLst>
+          </p:cNvPr>
+          <p:cNvSpPr/>
+          <p:nvPr/>
+        </p:nvSpPr>
+        <p:spPr>
+          <a:xfrm>
+            <a:off x="7553326" y="2598820"/>
+            <a:ext cx="2286000" cy="2550695"/>
+          </a:xfrm>
+          <a:prstGeom prst="rect">
+            <a:avLst/>
+          </a:prstGeom>
+          <a:ln>
+            <a:noFill/>
+          </a:ln>
+          <a:effectLst>
+            <a:outerShdw blurRad="107950" dist="12700" dir="5400000" algn="ctr">
+              <a:srgbClr val="000000"/>
+            </a:outerShdw>
+          </a:effectLst>
+          <a:scene3d>
+            <a:camera prst="orthographicFront">
+              <a:rot lat="0" lon="0" rev="0"/>
+            </a:camera>
+            <a:lightRig rig="soft" dir="t">
+              <a:rot lat="0" lon="0" rev="0"/>
+            </a:lightRig>
+          </a:scene3d>
+          <a:sp3d contourW="44450" prstMaterial="matte">
+            <a:bevelT w="63500" h="63500" prst="artDeco"/>
+            <a:contourClr>
+              <a:srgbClr val="FFFFFF"/>
+            </a:contourClr>
+          </a:sp3d>
+        </p:spPr>
+        <p:style>
+          <a:lnRef idx="2">
+            <a:schemeClr val="accent1">
+              <a:shade val="50000"/>
+            </a:schemeClr>
+          </a:lnRef>
+          <a:fillRef idx="1">
+            <a:schemeClr val="accent1"/>
+          </a:fillRef>
+          <a:effectRef idx="0">
+            <a:schemeClr val="accent1"/>
+          </a:effectRef>
+          <a:fontRef idx="minor">
+            <a:schemeClr val="lt1"/>
+          </a:fontRef>
+        </p:style>
+        <p:txBody>
+          <a:bodyPr rtlCol="0" anchor="ctr"/>
+          <a:lstStyle/>
+          <a:p>
+            <a:pPr algn="ctr"/>
+            <a:r>
+              <a:rPr lang="en-US" sz="2200" dirty="0"/>
+              <a:t>DORITO FLAVORS</a:t>
+            </a:r>
+          </a:p>
+        </p:txBody>
+      </p:sp>
+      <p:sp>
+        <p:nvSpPr>
+          <p:cNvPr id="13" name="Rectangle 12">
+            <a:extLst>
+              <a:ext uri="{FF2B5EF4-FFF2-40B4-BE49-F238E27FC236}">
+                <a16:creationId xmlns:a16="http://schemas.microsoft.com/office/drawing/2014/main" id="{F802E26B-5E4A-4B00-8F95-8D503221BCD6}"/>
+              </a:ext>
+            </a:extLst>
+          </p:cNvPr>
+          <p:cNvSpPr/>
+          <p:nvPr/>
+        </p:nvSpPr>
+        <p:spPr>
+          <a:xfrm>
+            <a:off x="2352674" y="5400676"/>
+            <a:ext cx="2286000" cy="402431"/>
+          </a:xfrm>
+          <a:prstGeom prst="rect">
+            <a:avLst/>
+          </a:prstGeom>
+          <a:ln>
+            <a:noFill/>
+          </a:ln>
+          <a:effectLst>
+            <a:outerShdw blurRad="107950" dist="12700" dir="5400000" algn="ctr">
+              <a:srgbClr val="000000"/>
+            </a:outerShdw>
+          </a:effectLst>
+          <a:scene3d>
+            <a:camera prst="orthographicFront">
+              <a:rot lat="0" lon="0" rev="0"/>
+            </a:camera>
+            <a:lightRig rig="soft" dir="t">
+              <a:rot lat="0" lon="0" rev="0"/>
+            </a:lightRig>
+          </a:scene3d>
+          <a:sp3d contourW="44450" prstMaterial="matte">
+            <a:bevelT w="63500" h="63500" prst="artDeco"/>
+            <a:contourClr>
+              <a:srgbClr val="FFFFFF"/>
+            </a:contourClr>
+          </a:sp3d>
+        </p:spPr>
+        <p:style>
+          <a:lnRef idx="2">
+            <a:schemeClr val="accent1">
+              <a:shade val="50000"/>
+            </a:schemeClr>
+          </a:lnRef>
+          <a:fillRef idx="1">
+            <a:schemeClr val="accent1"/>
+          </a:fillRef>
+          <a:effectRef idx="0">
+            <a:schemeClr val="accent1"/>
+          </a:effectRef>
+          <a:fontRef idx="minor">
+            <a:schemeClr val="lt1"/>
+          </a:fontRef>
+        </p:style>
+        <p:txBody>
+          <a:bodyPr rtlCol="0" anchor="ctr"/>
+          <a:lstStyle/>
+          <a:p>
+            <a:pPr algn="ctr"/>
+            <a:endParaRPr lang="en-US"/>
+          </a:p>
+        </p:txBody>
+      </p:sp>
+      <p:sp>
+        <p:nvSpPr>
+          <p:cNvPr id="14" name="Rectangle 13">
+            <a:extLst>
+              <a:ext uri="{FF2B5EF4-FFF2-40B4-BE49-F238E27FC236}">
+                <a16:creationId xmlns:a16="http://schemas.microsoft.com/office/drawing/2014/main" id="{07A2AE3A-A24D-4D2E-BA21-420D2BDDFCB6}"/>
+              </a:ext>
+            </a:extLst>
+          </p:cNvPr>
+          <p:cNvSpPr/>
+          <p:nvPr/>
+        </p:nvSpPr>
+        <p:spPr>
+          <a:xfrm>
+            <a:off x="4953000" y="5400676"/>
+            <a:ext cx="2286000" cy="402431"/>
+          </a:xfrm>
+          <a:prstGeom prst="rect">
+            <a:avLst/>
+          </a:prstGeom>
+          <a:ln>
+            <a:noFill/>
+          </a:ln>
+          <a:effectLst>
+            <a:outerShdw blurRad="107950" dist="12700" dir="5400000" algn="ctr">
+              <a:srgbClr val="000000"/>
+            </a:outerShdw>
+          </a:effectLst>
+          <a:scene3d>
+            <a:camera prst="orthographicFront">
+              <a:rot lat="0" lon="0" rev="0"/>
+            </a:camera>
+            <a:lightRig rig="soft" dir="t">
+              <a:rot lat="0" lon="0" rev="0"/>
+            </a:lightRig>
+          </a:scene3d>
+          <a:sp3d contourW="44450" prstMaterial="matte">
+            <a:bevelT w="63500" h="63500" prst="artDeco"/>
+            <a:contourClr>
+              <a:srgbClr val="FFFFFF"/>
+            </a:contourClr>
+          </a:sp3d>
+        </p:spPr>
+        <p:style>
+          <a:lnRef idx="2">
+            <a:schemeClr val="accent1">
+              <a:shade val="50000"/>
+            </a:schemeClr>
+          </a:lnRef>
+          <a:fillRef idx="1">
+            <a:schemeClr val="accent1"/>
+          </a:fillRef>
+          <a:effectRef idx="0">
+            <a:schemeClr val="accent1"/>
+          </a:effectRef>
+          <a:fontRef idx="minor">
+            <a:schemeClr val="lt1"/>
+          </a:fontRef>
+        </p:style>
+        <p:txBody>
+          <a:bodyPr rtlCol="0" anchor="ctr"/>
+          <a:lstStyle/>
+          <a:p>
+            <a:pPr algn="ctr"/>
+            <a:endParaRPr lang="en-US"/>
+          </a:p>
+        </p:txBody>
+      </p:sp>
+      <p:sp>
+        <p:nvSpPr>
+          <p:cNvPr id="15" name="Rectangle 14">
+            <a:extLst>
+              <a:ext uri="{FF2B5EF4-FFF2-40B4-BE49-F238E27FC236}">
+                <a16:creationId xmlns:a16="http://schemas.microsoft.com/office/drawing/2014/main" id="{745E1BA5-EBB3-4627-A225-478DCB30D817}"/>
+              </a:ext>
+            </a:extLst>
+          </p:cNvPr>
+          <p:cNvSpPr/>
+          <p:nvPr/>
+        </p:nvSpPr>
+        <p:spPr>
+          <a:xfrm>
+            <a:off x="7553326" y="5400676"/>
+            <a:ext cx="2286000" cy="402431"/>
+          </a:xfrm>
+          <a:prstGeom prst="rect">
+            <a:avLst/>
+          </a:prstGeom>
+          <a:ln>
+            <a:noFill/>
+          </a:ln>
+          <a:effectLst>
+            <a:outerShdw blurRad="107950" dist="12700" dir="5400000" algn="ctr">
+              <a:srgbClr val="000000"/>
+            </a:outerShdw>
+          </a:effectLst>
+          <a:scene3d>
+            <a:camera prst="orthographicFront">
+              <a:rot lat="0" lon="0" rev="0"/>
+            </a:camera>
+            <a:lightRig rig="soft" dir="t">
+              <a:rot lat="0" lon="0" rev="0"/>
+            </a:lightRig>
+          </a:scene3d>
+          <a:sp3d contourW="44450" prstMaterial="matte">
+            <a:bevelT w="63500" h="63500" prst="artDeco"/>
+            <a:contourClr>
+              <a:srgbClr val="FFFFFF"/>
+            </a:contourClr>
+          </a:sp3d>
+        </p:spPr>
+        <p:style>
+          <a:lnRef idx="2">
+            <a:schemeClr val="accent1">
+              <a:shade val="50000"/>
+            </a:schemeClr>
+          </a:lnRef>
+          <a:fillRef idx="1">
+            <a:schemeClr val="accent1"/>
+          </a:fillRef>
+          <a:effectRef idx="0">
+            <a:schemeClr val="accent1"/>
+          </a:effectRef>
+          <a:fontRef idx="minor">
+            <a:schemeClr val="lt1"/>
+          </a:fontRef>
+        </p:style>
+        <p:txBody>
+          <a:bodyPr rtlCol="0" anchor="ctr"/>
+          <a:lstStyle/>
+          <a:p>
+            <a:pPr algn="ctr"/>
+            <a:endParaRPr lang="en-US"/>
+          </a:p>
+        </p:txBody>
+      </p:sp>
       <p:grpSp>
         <p:nvGrpSpPr>
           <p:cNvPr id="16" name="Group 15">
@@ -4352,1650 +5793,6 @@
       </p:grpSp>
       <p:sp>
         <p:nvSpPr>
-          <p:cNvPr id="3" name="Rectangle 2">
-            <a:extLst>
-              <a:ext uri="{FF2B5EF4-FFF2-40B4-BE49-F238E27FC236}">
-                <a16:creationId xmlns:a16="http://schemas.microsoft.com/office/drawing/2014/main" id="{78F3DD19-8C6E-49E2-A900-82F3D1607801}"/>
-              </a:ext>
-            </a:extLst>
-          </p:cNvPr>
-          <p:cNvSpPr/>
-          <p:nvPr/>
-        </p:nvSpPr>
-        <p:spPr>
-          <a:xfrm>
-            <a:off x="838200" y="1457324"/>
-            <a:ext cx="2367013" cy="4345783"/>
-          </a:xfrm>
-          <a:prstGeom prst="rect">
-            <a:avLst/>
-          </a:prstGeom>
-          <a:solidFill>
-            <a:srgbClr val="192C4F"/>
-          </a:solidFill>
-        </p:spPr>
-        <p:style>
-          <a:lnRef idx="2">
-            <a:schemeClr val="accent1">
-              <a:shade val="50000"/>
-            </a:schemeClr>
-          </a:lnRef>
-          <a:fillRef idx="1">
-            <a:schemeClr val="accent1"/>
-          </a:fillRef>
-          <a:effectRef idx="0">
-            <a:schemeClr val="accent1"/>
-          </a:effectRef>
-          <a:fontRef idx="minor">
-            <a:schemeClr val="lt1"/>
-          </a:fontRef>
-        </p:style>
-        <p:txBody>
-          <a:bodyPr rtlCol="0" anchor="ctr"/>
-          <a:lstStyle/>
-          <a:p>
-            <a:r>
-              <a:rPr lang="en-US" sz="1600" dirty="0"/>
-              <a:t>User</a:t>
-            </a:r>
-          </a:p>
-          <a:p>
-            <a:endParaRPr lang="en-US" u="sng" dirty="0"/>
-          </a:p>
-          <a:p>
-            <a:r>
-              <a:rPr lang="en-US" sz="1600" dirty="0"/>
-              <a:t>Password</a:t>
-            </a:r>
-            <a:endParaRPr lang="en-US" dirty="0"/>
-          </a:p>
-          <a:p>
-            <a:br>
-              <a:rPr lang="en-US" sz="900" dirty="0"/>
-            </a:br>
-            <a:r>
-              <a:rPr lang="en-US" sz="1100" dirty="0"/>
-              <a:t>Trouble?</a:t>
-            </a:r>
-          </a:p>
-        </p:txBody>
-      </p:sp>
-      <p:cxnSp>
-        <p:nvCxnSpPr>
-          <p:cNvPr id="6" name="Straight Connector 5">
-            <a:extLst>
-              <a:ext uri="{FF2B5EF4-FFF2-40B4-BE49-F238E27FC236}">
-                <a16:creationId xmlns:a16="http://schemas.microsoft.com/office/drawing/2014/main" id="{02DA4FF1-2D7F-4A19-9674-67D3214AD8C0}"/>
-              </a:ext>
-            </a:extLst>
-          </p:cNvPr>
-          <p:cNvCxnSpPr/>
-          <p:nvPr/>
-        </p:nvCxnSpPr>
-        <p:spPr>
-          <a:xfrm>
-            <a:off x="943472" y="3301465"/>
-            <a:ext cx="2057400" cy="0"/>
-          </a:xfrm>
-          <a:prstGeom prst="line">
-            <a:avLst/>
-          </a:prstGeom>
-          <a:ln w="12700"/>
-        </p:spPr>
-        <p:style>
-          <a:lnRef idx="1">
-            <a:schemeClr val="accent1"/>
-          </a:lnRef>
-          <a:fillRef idx="0">
-            <a:schemeClr val="accent1"/>
-          </a:fillRef>
-          <a:effectRef idx="0">
-            <a:schemeClr val="accent1"/>
-          </a:effectRef>
-          <a:fontRef idx="minor">
-            <a:schemeClr val="tx1"/>
-          </a:fontRef>
-        </p:style>
-      </p:cxnSp>
-      <p:cxnSp>
-        <p:nvCxnSpPr>
-          <p:cNvPr id="19" name="Straight Connector 18">
-            <a:extLst>
-              <a:ext uri="{FF2B5EF4-FFF2-40B4-BE49-F238E27FC236}">
-                <a16:creationId xmlns:a16="http://schemas.microsoft.com/office/drawing/2014/main" id="{0D2F3708-3C57-46BC-943E-E900008E586D}"/>
-              </a:ext>
-            </a:extLst>
-          </p:cNvPr>
-          <p:cNvCxnSpPr/>
-          <p:nvPr/>
-        </p:nvCxnSpPr>
-        <p:spPr>
-          <a:xfrm>
-            <a:off x="943472" y="3843332"/>
-            <a:ext cx="2057400" cy="0"/>
-          </a:xfrm>
-          <a:prstGeom prst="line">
-            <a:avLst/>
-          </a:prstGeom>
-          <a:ln w="12700"/>
-        </p:spPr>
-        <p:style>
-          <a:lnRef idx="1">
-            <a:schemeClr val="accent1"/>
-          </a:lnRef>
-          <a:fillRef idx="0">
-            <a:schemeClr val="accent1"/>
-          </a:fillRef>
-          <a:effectRef idx="0">
-            <a:schemeClr val="accent1"/>
-          </a:effectRef>
-          <a:fontRef idx="minor">
-            <a:schemeClr val="tx1"/>
-          </a:fontRef>
-        </p:style>
-      </p:cxnSp>
-      <p:sp>
-        <p:nvSpPr>
-          <p:cNvPr id="20" name="Rectangle 19">
-            <a:extLst>
-              <a:ext uri="{FF2B5EF4-FFF2-40B4-BE49-F238E27FC236}">
-                <a16:creationId xmlns:a16="http://schemas.microsoft.com/office/drawing/2014/main" id="{33FA23E7-D72F-4D63-94B0-51BFD4AD7C1A}"/>
-              </a:ext>
-            </a:extLst>
-          </p:cNvPr>
-          <p:cNvSpPr/>
-          <p:nvPr/>
-        </p:nvSpPr>
-        <p:spPr>
-          <a:xfrm>
-            <a:off x="0" y="6267450"/>
-            <a:ext cx="12192000" cy="571500"/>
-          </a:xfrm>
-          <a:prstGeom prst="rect">
-            <a:avLst/>
-          </a:prstGeom>
-        </p:spPr>
-        <p:style>
-          <a:lnRef idx="2">
-            <a:schemeClr val="dk1">
-              <a:shade val="50000"/>
-            </a:schemeClr>
-          </a:lnRef>
-          <a:fillRef idx="1">
-            <a:schemeClr val="dk1"/>
-          </a:fillRef>
-          <a:effectRef idx="0">
-            <a:schemeClr val="dk1"/>
-          </a:effectRef>
-          <a:fontRef idx="minor">
-            <a:schemeClr val="lt1"/>
-          </a:fontRef>
-        </p:style>
-        <p:txBody>
-          <a:bodyPr rtlCol="0" anchor="ctr"/>
-          <a:lstStyle/>
-          <a:p>
-            <a:pPr algn="ctr"/>
-            <a:r>
-              <a:rPr lang="en-US" sz="2800" dirty="0">
-                <a:latin typeface="AR DELANEY" panose="02000000000000000000" pitchFamily="2" charset="0"/>
-              </a:rPr>
-              <a:t>PPLpleaser.com</a:t>
-            </a:r>
-          </a:p>
-        </p:txBody>
-      </p:sp>
-    </p:spTree>
-    <p:extLst>
-      <p:ext uri="{BB962C8B-B14F-4D97-AF65-F5344CB8AC3E}">
-        <p14:creationId xmlns:p14="http://schemas.microsoft.com/office/powerpoint/2010/main" val="771016331"/>
-      </p:ext>
-    </p:extLst>
-  </p:cSld>
-  <p:clrMapOvr>
-    <a:masterClrMapping/>
-  </p:clrMapOvr>
-</p:sld>
-</file>
-
-<file path=ppt/slides/slide12.xml><?xml version="1.0" encoding="utf-8"?>
-<p:sld xmlns:a="http://schemas.openxmlformats.org/drawingml/2006/main" xmlns:r="http://schemas.openxmlformats.org/officeDocument/2006/relationships" xmlns:p="http://schemas.openxmlformats.org/presentationml/2006/main">
-  <p:cSld>
-    <p:spTree>
-      <p:nvGrpSpPr>
-        <p:cNvPr id="1" name=""/>
-        <p:cNvGrpSpPr/>
-        <p:nvPr/>
-      </p:nvGrpSpPr>
-      <p:grpSpPr>
-        <a:xfrm>
-          <a:off x="0" y="0"/>
-          <a:ext cx="0" cy="0"/>
-          <a:chOff x="0" y="0"/>
-          <a:chExt cx="0" cy="0"/>
-        </a:xfrm>
-      </p:grpSpPr>
-      <p:sp>
-        <p:nvSpPr>
-          <p:cNvPr id="21" name="Isosceles Triangle 20">
-            <a:extLst>
-              <a:ext uri="{FF2B5EF4-FFF2-40B4-BE49-F238E27FC236}">
-                <a16:creationId xmlns:a16="http://schemas.microsoft.com/office/drawing/2014/main" id="{C1ED0A04-5731-4599-B0CA-9AED19C20B21}"/>
-              </a:ext>
-            </a:extLst>
-          </p:cNvPr>
-          <p:cNvSpPr/>
-          <p:nvPr/>
-        </p:nvSpPr>
-        <p:spPr>
-          <a:xfrm>
-            <a:off x="5210175" y="5357061"/>
-            <a:ext cx="1781175" cy="1019175"/>
-          </a:xfrm>
-          <a:prstGeom prst="triangle">
-            <a:avLst/>
-          </a:prstGeom>
-        </p:spPr>
-        <p:style>
-          <a:lnRef idx="2">
-            <a:schemeClr val="dk1">
-              <a:shade val="50000"/>
-            </a:schemeClr>
-          </a:lnRef>
-          <a:fillRef idx="1">
-            <a:schemeClr val="dk1"/>
-          </a:fillRef>
-          <a:effectRef idx="0">
-            <a:schemeClr val="dk1"/>
-          </a:effectRef>
-          <a:fontRef idx="minor">
-            <a:schemeClr val="lt1"/>
-          </a:fontRef>
-        </p:style>
-        <p:txBody>
-          <a:bodyPr rtlCol="0" anchor="ctr"/>
-          <a:lstStyle/>
-          <a:p>
-            <a:pPr algn="ctr"/>
-            <a:endParaRPr lang="en-US"/>
-          </a:p>
-        </p:txBody>
-      </p:sp>
-      <p:sp>
-        <p:nvSpPr>
-          <p:cNvPr id="2" name="Title 1">
-            <a:extLst>
-              <a:ext uri="{FF2B5EF4-FFF2-40B4-BE49-F238E27FC236}">
-                <a16:creationId xmlns:a16="http://schemas.microsoft.com/office/drawing/2014/main" id="{CE7D1F5A-C74C-4522-9EA2-4BE11F79232C}"/>
-              </a:ext>
-            </a:extLst>
-          </p:cNvPr>
-          <p:cNvSpPr>
-            <a:spLocks noGrp="1"/>
-          </p:cNvSpPr>
-          <p:nvPr>
-            <p:ph type="title"/>
-          </p:nvPr>
-        </p:nvSpPr>
-        <p:spPr/>
-        <p:txBody>
-          <a:bodyPr/>
-          <a:lstStyle/>
-          <a:p>
-            <a:r>
-              <a:rPr lang="en-US" b="1" dirty="0"/>
-              <a:t>SIGN IN </a:t>
-            </a:r>
-            <a:r>
-              <a:rPr lang="en-US" dirty="0"/>
-              <a:t>Page (</a:t>
-            </a:r>
-            <a:r>
-              <a:rPr lang="en-US" dirty="0">
-                <a:solidFill>
-                  <a:srgbClr val="FF0000"/>
-                </a:solidFill>
-              </a:rPr>
-              <a:t>Top version</a:t>
-            </a:r>
-            <a:r>
-              <a:rPr lang="en-US" dirty="0"/>
-              <a:t>)</a:t>
-            </a:r>
-          </a:p>
-        </p:txBody>
-      </p:sp>
-      <p:sp>
-        <p:nvSpPr>
-          <p:cNvPr id="9" name="Rectangle 8">
-            <a:extLst>
-              <a:ext uri="{FF2B5EF4-FFF2-40B4-BE49-F238E27FC236}">
-                <a16:creationId xmlns:a16="http://schemas.microsoft.com/office/drawing/2014/main" id="{0EE6495E-1FFE-446F-A3EA-A1933561AFE8}"/>
-              </a:ext>
-            </a:extLst>
-          </p:cNvPr>
-          <p:cNvSpPr/>
-          <p:nvPr/>
-        </p:nvSpPr>
-        <p:spPr>
-          <a:xfrm>
-            <a:off x="838200" y="1457324"/>
-            <a:ext cx="10515601" cy="4391025"/>
-          </a:xfrm>
-          <a:prstGeom prst="rect">
-            <a:avLst/>
-          </a:prstGeom>
-          <a:solidFill>
-            <a:schemeClr val="bg1">
-              <a:lumMod val="85000"/>
-            </a:schemeClr>
-          </a:solidFill>
-          <a:ln w="38100"/>
-        </p:spPr>
-        <p:style>
-          <a:lnRef idx="2">
-            <a:schemeClr val="dk1"/>
-          </a:lnRef>
-          <a:fillRef idx="1">
-            <a:schemeClr val="lt1"/>
-          </a:fillRef>
-          <a:effectRef idx="0">
-            <a:schemeClr val="dk1"/>
-          </a:effectRef>
-          <a:fontRef idx="minor">
-            <a:schemeClr val="dk1"/>
-          </a:fontRef>
-        </p:style>
-        <p:txBody>
-          <a:bodyPr rtlCol="0" anchor="t"/>
-          <a:lstStyle/>
-          <a:p>
-            <a:pPr algn="ctr"/>
-            <a:endParaRPr lang="en-US" dirty="0"/>
-          </a:p>
-        </p:txBody>
-      </p:sp>
-      <p:sp>
-        <p:nvSpPr>
-          <p:cNvPr id="3" name="Rectangle 2">
-            <a:extLst>
-              <a:ext uri="{FF2B5EF4-FFF2-40B4-BE49-F238E27FC236}">
-                <a16:creationId xmlns:a16="http://schemas.microsoft.com/office/drawing/2014/main" id="{78F3DD19-8C6E-49E2-A900-82F3D1607801}"/>
-              </a:ext>
-            </a:extLst>
-          </p:cNvPr>
-          <p:cNvSpPr/>
-          <p:nvPr/>
-        </p:nvSpPr>
-        <p:spPr>
-          <a:xfrm>
-            <a:off x="838200" y="1457325"/>
-            <a:ext cx="10515600" cy="1112500"/>
-          </a:xfrm>
-          <a:prstGeom prst="rect">
-            <a:avLst/>
-          </a:prstGeom>
-          <a:solidFill>
-            <a:srgbClr val="192C4F"/>
-          </a:solidFill>
-        </p:spPr>
-        <p:style>
-          <a:lnRef idx="2">
-            <a:schemeClr val="accent1">
-              <a:shade val="50000"/>
-            </a:schemeClr>
-          </a:lnRef>
-          <a:fillRef idx="1">
-            <a:schemeClr val="accent1"/>
-          </a:fillRef>
-          <a:effectRef idx="0">
-            <a:schemeClr val="accent1"/>
-          </a:effectRef>
-          <a:fontRef idx="minor">
-            <a:schemeClr val="lt1"/>
-          </a:fontRef>
-        </p:style>
-        <p:txBody>
-          <a:bodyPr rtlCol="0" anchor="ctr"/>
-          <a:lstStyle/>
-          <a:p>
-            <a:pPr algn="ctr"/>
-            <a:r>
-              <a:rPr lang="en-US" sz="1600" dirty="0"/>
-              <a:t>User </a:t>
-            </a:r>
-            <a:r>
-              <a:rPr lang="en-US" sz="1600" dirty="0">
-                <a:solidFill>
-                  <a:schemeClr val="accent1">
-                    <a:lumMod val="50000"/>
-                  </a:schemeClr>
-                </a:solidFill>
-              </a:rPr>
-              <a:t>_____________</a:t>
-            </a:r>
-            <a:r>
-              <a:rPr lang="en-US" sz="1600" dirty="0"/>
-              <a:t> Password</a:t>
-            </a:r>
-            <a:r>
-              <a:rPr lang="en-US" sz="1600" dirty="0">
-                <a:solidFill>
-                  <a:schemeClr val="accent1">
-                    <a:lumMod val="50000"/>
-                  </a:schemeClr>
-                </a:solidFill>
-              </a:rPr>
-              <a:t>_____________</a:t>
-            </a:r>
-            <a:br>
-              <a:rPr lang="en-US" sz="1600" dirty="0"/>
-            </a:br>
-            <a:br>
-              <a:rPr lang="en-US" sz="1100" dirty="0"/>
-            </a:br>
-            <a:r>
-              <a:rPr lang="en-US" sz="1100" dirty="0"/>
-              <a:t>Trouble logging in?</a:t>
-            </a:r>
-          </a:p>
-        </p:txBody>
-      </p:sp>
-      <p:cxnSp>
-        <p:nvCxnSpPr>
-          <p:cNvPr id="6" name="Straight Connector 5">
-            <a:extLst>
-              <a:ext uri="{FF2B5EF4-FFF2-40B4-BE49-F238E27FC236}">
-                <a16:creationId xmlns:a16="http://schemas.microsoft.com/office/drawing/2014/main" id="{02DA4FF1-2D7F-4A19-9674-67D3214AD8C0}"/>
-              </a:ext>
-            </a:extLst>
-          </p:cNvPr>
-          <p:cNvCxnSpPr/>
-          <p:nvPr/>
-        </p:nvCxnSpPr>
-        <p:spPr>
-          <a:xfrm>
-            <a:off x="4162425" y="1953148"/>
-            <a:ext cx="1600200" cy="0"/>
-          </a:xfrm>
-          <a:prstGeom prst="line">
-            <a:avLst/>
-          </a:prstGeom>
-          <a:ln w="12700"/>
-        </p:spPr>
-        <p:style>
-          <a:lnRef idx="1">
-            <a:schemeClr val="accent1"/>
-          </a:lnRef>
-          <a:fillRef idx="0">
-            <a:schemeClr val="accent1"/>
-          </a:fillRef>
-          <a:effectRef idx="0">
-            <a:schemeClr val="accent1"/>
-          </a:effectRef>
-          <a:fontRef idx="minor">
-            <a:schemeClr val="tx1"/>
-          </a:fontRef>
-        </p:style>
-      </p:cxnSp>
-      <p:sp>
-        <p:nvSpPr>
-          <p:cNvPr id="20" name="Rectangle 19">
-            <a:extLst>
-              <a:ext uri="{FF2B5EF4-FFF2-40B4-BE49-F238E27FC236}">
-                <a16:creationId xmlns:a16="http://schemas.microsoft.com/office/drawing/2014/main" id="{33FA23E7-D72F-4D63-94B0-51BFD4AD7C1A}"/>
-              </a:ext>
-            </a:extLst>
-          </p:cNvPr>
-          <p:cNvSpPr/>
-          <p:nvPr/>
-        </p:nvSpPr>
-        <p:spPr>
-          <a:xfrm>
-            <a:off x="0" y="6267450"/>
-            <a:ext cx="12192000" cy="571500"/>
-          </a:xfrm>
-          <a:prstGeom prst="rect">
-            <a:avLst/>
-          </a:prstGeom>
-        </p:spPr>
-        <p:style>
-          <a:lnRef idx="2">
-            <a:schemeClr val="dk1">
-              <a:shade val="50000"/>
-            </a:schemeClr>
-          </a:lnRef>
-          <a:fillRef idx="1">
-            <a:schemeClr val="dk1"/>
-          </a:fillRef>
-          <a:effectRef idx="0">
-            <a:schemeClr val="dk1"/>
-          </a:effectRef>
-          <a:fontRef idx="minor">
-            <a:schemeClr val="lt1"/>
-          </a:fontRef>
-        </p:style>
-        <p:txBody>
-          <a:bodyPr rtlCol="0" anchor="ctr"/>
-          <a:lstStyle/>
-          <a:p>
-            <a:pPr algn="ctr"/>
-            <a:r>
-              <a:rPr lang="en-US" sz="2800" dirty="0">
-                <a:latin typeface="AR DELANEY" panose="02000000000000000000" pitchFamily="2" charset="0"/>
-              </a:rPr>
-              <a:t>PPLpleaser.com</a:t>
-            </a:r>
-          </a:p>
-        </p:txBody>
-      </p:sp>
-      <p:sp>
-        <p:nvSpPr>
-          <p:cNvPr id="10" name="Rectangle 9">
-            <a:extLst>
-              <a:ext uri="{FF2B5EF4-FFF2-40B4-BE49-F238E27FC236}">
-                <a16:creationId xmlns:a16="http://schemas.microsoft.com/office/drawing/2014/main" id="{3C560313-DD10-4CD9-9834-BE0881C64A19}"/>
-              </a:ext>
-            </a:extLst>
-          </p:cNvPr>
-          <p:cNvSpPr/>
-          <p:nvPr/>
-        </p:nvSpPr>
-        <p:spPr>
-          <a:xfrm>
-            <a:off x="2352674" y="3707952"/>
-            <a:ext cx="2286000" cy="2074781"/>
-          </a:xfrm>
-          <a:prstGeom prst="rect">
-            <a:avLst/>
-          </a:prstGeom>
-          <a:ln>
-            <a:noFill/>
-          </a:ln>
-          <a:effectLst>
-            <a:outerShdw blurRad="107950" dist="12700" dir="5400000" algn="ctr">
-              <a:srgbClr val="000000"/>
-            </a:outerShdw>
-          </a:effectLst>
-          <a:scene3d>
-            <a:camera prst="orthographicFront">
-              <a:rot lat="0" lon="0" rev="0"/>
-            </a:camera>
-            <a:lightRig rig="soft" dir="t">
-              <a:rot lat="0" lon="0" rev="0"/>
-            </a:lightRig>
-          </a:scene3d>
-          <a:sp3d contourW="44450" prstMaterial="matte">
-            <a:bevelT w="63500" h="63500" prst="artDeco"/>
-            <a:contourClr>
-              <a:srgbClr val="FFFFFF"/>
-            </a:contourClr>
-          </a:sp3d>
-        </p:spPr>
-        <p:style>
-          <a:lnRef idx="2">
-            <a:schemeClr val="accent1">
-              <a:shade val="50000"/>
-            </a:schemeClr>
-          </a:lnRef>
-          <a:fillRef idx="1">
-            <a:schemeClr val="accent1"/>
-          </a:fillRef>
-          <a:effectRef idx="0">
-            <a:schemeClr val="accent1"/>
-          </a:effectRef>
-          <a:fontRef idx="minor">
-            <a:schemeClr val="lt1"/>
-          </a:fontRef>
-        </p:style>
-        <p:txBody>
-          <a:bodyPr rtlCol="0" anchor="ctr"/>
-          <a:lstStyle/>
-          <a:p>
-            <a:pPr algn="ctr"/>
-            <a:r>
-              <a:rPr lang="en-US" sz="2200" dirty="0"/>
-              <a:t>SODA FLAVORS</a:t>
-            </a:r>
-          </a:p>
-        </p:txBody>
-      </p:sp>
-      <p:sp>
-        <p:nvSpPr>
-          <p:cNvPr id="11" name="Rectangle 10">
-            <a:extLst>
-              <a:ext uri="{FF2B5EF4-FFF2-40B4-BE49-F238E27FC236}">
-                <a16:creationId xmlns:a16="http://schemas.microsoft.com/office/drawing/2014/main" id="{3965F2FB-F5EB-46B7-90BC-F9804D3FFC8B}"/>
-              </a:ext>
-            </a:extLst>
-          </p:cNvPr>
-          <p:cNvSpPr/>
-          <p:nvPr/>
-        </p:nvSpPr>
-        <p:spPr>
-          <a:xfrm>
-            <a:off x="4953000" y="3707952"/>
-            <a:ext cx="2286000" cy="2074781"/>
-          </a:xfrm>
-          <a:prstGeom prst="rect">
-            <a:avLst/>
-          </a:prstGeom>
-          <a:ln>
-            <a:noFill/>
-          </a:ln>
-          <a:effectLst>
-            <a:outerShdw blurRad="107950" dist="12700" dir="5400000" algn="ctr">
-              <a:srgbClr val="000000"/>
-            </a:outerShdw>
-          </a:effectLst>
-          <a:scene3d>
-            <a:camera prst="orthographicFront">
-              <a:rot lat="0" lon="0" rev="0"/>
-            </a:camera>
-            <a:lightRig rig="soft" dir="t">
-              <a:rot lat="0" lon="0" rev="0"/>
-            </a:lightRig>
-          </a:scene3d>
-          <a:sp3d contourW="44450" prstMaterial="matte">
-            <a:bevelT w="63500" h="63500" prst="artDeco"/>
-            <a:contourClr>
-              <a:srgbClr val="FFFFFF"/>
-            </a:contourClr>
-          </a:sp3d>
-        </p:spPr>
-        <p:style>
-          <a:lnRef idx="2">
-            <a:schemeClr val="accent1">
-              <a:shade val="50000"/>
-            </a:schemeClr>
-          </a:lnRef>
-          <a:fillRef idx="1">
-            <a:schemeClr val="accent1"/>
-          </a:fillRef>
-          <a:effectRef idx="0">
-            <a:schemeClr val="accent1"/>
-          </a:effectRef>
-          <a:fontRef idx="minor">
-            <a:schemeClr val="lt1"/>
-          </a:fontRef>
-        </p:style>
-        <p:txBody>
-          <a:bodyPr rtlCol="0" anchor="ctr"/>
-          <a:lstStyle/>
-          <a:p>
-            <a:pPr algn="ctr"/>
-            <a:r>
-              <a:rPr lang="en-US" sz="2200" dirty="0" err="1"/>
-              <a:t>GoT</a:t>
-            </a:r>
-            <a:r>
-              <a:rPr lang="en-US" sz="2200" dirty="0"/>
-              <a:t> CHARACTERS</a:t>
-            </a:r>
-          </a:p>
-        </p:txBody>
-      </p:sp>
-      <p:sp>
-        <p:nvSpPr>
-          <p:cNvPr id="12" name="Rectangle 11">
-            <a:extLst>
-              <a:ext uri="{FF2B5EF4-FFF2-40B4-BE49-F238E27FC236}">
-                <a16:creationId xmlns:a16="http://schemas.microsoft.com/office/drawing/2014/main" id="{D7A96DB2-2A3A-4EE9-B477-71BD0022C22F}"/>
-              </a:ext>
-            </a:extLst>
-          </p:cNvPr>
-          <p:cNvSpPr/>
-          <p:nvPr/>
-        </p:nvSpPr>
-        <p:spPr>
-          <a:xfrm>
-            <a:off x="7553326" y="3707952"/>
-            <a:ext cx="2286000" cy="2074781"/>
-          </a:xfrm>
-          <a:prstGeom prst="rect">
-            <a:avLst/>
-          </a:prstGeom>
-          <a:ln>
-            <a:noFill/>
-          </a:ln>
-          <a:effectLst>
-            <a:outerShdw blurRad="107950" dist="12700" dir="5400000" algn="ctr">
-              <a:srgbClr val="000000"/>
-            </a:outerShdw>
-          </a:effectLst>
-          <a:scene3d>
-            <a:camera prst="orthographicFront">
-              <a:rot lat="0" lon="0" rev="0"/>
-            </a:camera>
-            <a:lightRig rig="soft" dir="t">
-              <a:rot lat="0" lon="0" rev="0"/>
-            </a:lightRig>
-          </a:scene3d>
-          <a:sp3d contourW="44450" prstMaterial="matte">
-            <a:bevelT w="63500" h="63500" prst="artDeco"/>
-            <a:contourClr>
-              <a:srgbClr val="FFFFFF"/>
-            </a:contourClr>
-          </a:sp3d>
-        </p:spPr>
-        <p:style>
-          <a:lnRef idx="2">
-            <a:schemeClr val="accent1">
-              <a:shade val="50000"/>
-            </a:schemeClr>
-          </a:lnRef>
-          <a:fillRef idx="1">
-            <a:schemeClr val="accent1"/>
-          </a:fillRef>
-          <a:effectRef idx="0">
-            <a:schemeClr val="accent1"/>
-          </a:effectRef>
-          <a:fontRef idx="minor">
-            <a:schemeClr val="lt1"/>
-          </a:fontRef>
-        </p:style>
-        <p:txBody>
-          <a:bodyPr rtlCol="0" anchor="ctr"/>
-          <a:lstStyle/>
-          <a:p>
-            <a:pPr algn="ctr"/>
-            <a:r>
-              <a:rPr lang="en-US" sz="2200" dirty="0"/>
-              <a:t>DORITO FLAVORS</a:t>
-            </a:r>
-          </a:p>
-        </p:txBody>
-      </p:sp>
-      <p:grpSp>
-        <p:nvGrpSpPr>
-          <p:cNvPr id="16" name="Group 15">
-            <a:extLst>
-              <a:ext uri="{FF2B5EF4-FFF2-40B4-BE49-F238E27FC236}">
-                <a16:creationId xmlns:a16="http://schemas.microsoft.com/office/drawing/2014/main" id="{1A3A5337-107A-4552-8220-BD5BF8552C98}"/>
-              </a:ext>
-            </a:extLst>
-          </p:cNvPr>
-          <p:cNvGrpSpPr/>
-          <p:nvPr/>
-        </p:nvGrpSpPr>
-        <p:grpSpPr>
-          <a:xfrm>
-            <a:off x="5328846" y="2668667"/>
-            <a:ext cx="1534307" cy="1015663"/>
-            <a:chOff x="5457043" y="1559535"/>
-            <a:chExt cx="1534307" cy="1015663"/>
-          </a:xfrm>
-        </p:grpSpPr>
-        <p:sp>
-          <p:nvSpPr>
-            <p:cNvPr id="17" name="TextBox 16">
-              <a:extLst>
-                <a:ext uri="{FF2B5EF4-FFF2-40B4-BE49-F238E27FC236}">
-                  <a16:creationId xmlns:a16="http://schemas.microsoft.com/office/drawing/2014/main" id="{B854781F-DCF4-4ADA-80F2-406BF30D0359}"/>
-                </a:ext>
-              </a:extLst>
-            </p:cNvPr>
-            <p:cNvSpPr txBox="1"/>
-            <p:nvPr/>
-          </p:nvSpPr>
-          <p:spPr>
-            <a:xfrm>
-              <a:off x="5457043" y="1559535"/>
-              <a:ext cx="1277914" cy="1015663"/>
-            </a:xfrm>
-            <a:prstGeom prst="rect">
-              <a:avLst/>
-            </a:prstGeom>
-            <a:noFill/>
-          </p:spPr>
-          <p:txBody>
-            <a:bodyPr wrap="none" rtlCol="0">
-              <a:spAutoFit/>
-            </a:bodyPr>
-            <a:lstStyle/>
-            <a:p>
-              <a:r>
-                <a:rPr lang="en-US" sz="6000" dirty="0">
-                  <a:solidFill>
-                    <a:schemeClr val="accent1">
-                      <a:lumMod val="75000"/>
-                    </a:schemeClr>
-                  </a:solidFill>
-                  <a:effectLst>
-                    <a:outerShdw blurRad="38100" dist="38100" dir="2700000" algn="tl">
-                      <a:srgbClr val="000000">
-                        <a:alpha val="43137"/>
-                      </a:srgbClr>
-                    </a:outerShdw>
-                  </a:effectLst>
-                </a:rPr>
-                <a:t>ALL</a:t>
-              </a:r>
-            </a:p>
-          </p:txBody>
-        </p:sp>
-        <p:sp>
-          <p:nvSpPr>
-            <p:cNvPr id="18" name="Isosceles Triangle 17">
-              <a:extLst>
-                <a:ext uri="{FF2B5EF4-FFF2-40B4-BE49-F238E27FC236}">
-                  <a16:creationId xmlns:a16="http://schemas.microsoft.com/office/drawing/2014/main" id="{A92E32FB-59B5-4BCB-A9D7-A2DDBD19F035}"/>
-                </a:ext>
-              </a:extLst>
-            </p:cNvPr>
-            <p:cNvSpPr/>
-            <p:nvPr/>
-          </p:nvSpPr>
-          <p:spPr>
-            <a:xfrm flipV="1">
-              <a:off x="6702592" y="1867179"/>
-              <a:ext cx="288758" cy="400375"/>
-            </a:xfrm>
-            <a:prstGeom prst="triangle">
-              <a:avLst/>
-            </a:prstGeom>
-            <a:solidFill>
-              <a:schemeClr val="accent1">
-                <a:lumMod val="75000"/>
-              </a:schemeClr>
-            </a:solidFill>
-            <a:ln>
-              <a:noFill/>
-            </a:ln>
-            <a:effectLst>
-              <a:outerShdw blurRad="50800" dist="38100" dir="2700000" algn="tl" rotWithShape="0">
-                <a:prstClr val="black">
-                  <a:alpha val="40000"/>
-                </a:prstClr>
-              </a:outerShdw>
-            </a:effectLst>
-          </p:spPr>
-          <p:style>
-            <a:lnRef idx="2">
-              <a:schemeClr val="accent1">
-                <a:shade val="50000"/>
-              </a:schemeClr>
-            </a:lnRef>
-            <a:fillRef idx="1">
-              <a:schemeClr val="accent1"/>
-            </a:fillRef>
-            <a:effectRef idx="0">
-              <a:schemeClr val="accent1"/>
-            </a:effectRef>
-            <a:fontRef idx="minor">
-              <a:schemeClr val="lt1"/>
-            </a:fontRef>
-          </p:style>
-          <p:txBody>
-            <a:bodyPr rtlCol="0" anchor="ctr"/>
-            <a:lstStyle/>
-            <a:p>
-              <a:pPr algn="ctr"/>
-              <a:endParaRPr lang="en-US"/>
-            </a:p>
-          </p:txBody>
-        </p:sp>
-      </p:grpSp>
-      <p:cxnSp>
-        <p:nvCxnSpPr>
-          <p:cNvPr id="22" name="Straight Connector 21">
-            <a:extLst>
-              <a:ext uri="{FF2B5EF4-FFF2-40B4-BE49-F238E27FC236}">
-                <a16:creationId xmlns:a16="http://schemas.microsoft.com/office/drawing/2014/main" id="{07896B09-AA0A-476C-AF86-935CCD49EF3A}"/>
-              </a:ext>
-            </a:extLst>
-          </p:cNvPr>
-          <p:cNvCxnSpPr/>
-          <p:nvPr/>
-        </p:nvCxnSpPr>
-        <p:spPr>
-          <a:xfrm>
-            <a:off x="5953126" y="1953148"/>
-            <a:ext cx="1600200" cy="0"/>
-          </a:xfrm>
-          <a:prstGeom prst="line">
-            <a:avLst/>
-          </a:prstGeom>
-          <a:ln w="12700"/>
-        </p:spPr>
-        <p:style>
-          <a:lnRef idx="1">
-            <a:schemeClr val="accent1"/>
-          </a:lnRef>
-          <a:fillRef idx="0">
-            <a:schemeClr val="accent1"/>
-          </a:fillRef>
-          <a:effectRef idx="0">
-            <a:schemeClr val="accent1"/>
-          </a:effectRef>
-          <a:fontRef idx="minor">
-            <a:schemeClr val="tx1"/>
-          </a:fontRef>
-        </p:style>
-      </p:cxnSp>
-    </p:spTree>
-    <p:extLst>
-      <p:ext uri="{BB962C8B-B14F-4D97-AF65-F5344CB8AC3E}">
-        <p14:creationId xmlns:p14="http://schemas.microsoft.com/office/powerpoint/2010/main" val="2062874010"/>
-      </p:ext>
-    </p:extLst>
-  </p:cSld>
-  <p:clrMapOvr>
-    <a:masterClrMapping/>
-  </p:clrMapOvr>
-</p:sld>
-</file>
-
-<file path=ppt/slides/slide13.xml><?xml version="1.0" encoding="utf-8"?>
-<p:sld xmlns:a="http://schemas.openxmlformats.org/drawingml/2006/main" xmlns:r="http://schemas.openxmlformats.org/officeDocument/2006/relationships" xmlns:p="http://schemas.openxmlformats.org/presentationml/2006/main">
-  <p:cSld>
-    <p:spTree>
-      <p:nvGrpSpPr>
-        <p:cNvPr id="1" name=""/>
-        <p:cNvGrpSpPr/>
-        <p:nvPr/>
-      </p:nvGrpSpPr>
-      <p:grpSpPr>
-        <a:xfrm>
-          <a:off x="0" y="0"/>
-          <a:ext cx="0" cy="0"/>
-          <a:chOff x="0" y="0"/>
-          <a:chExt cx="0" cy="0"/>
-        </a:xfrm>
-      </p:grpSpPr>
-      <p:sp>
-        <p:nvSpPr>
-          <p:cNvPr id="20" name="Isosceles Triangle 19">
-            <a:extLst>
-              <a:ext uri="{FF2B5EF4-FFF2-40B4-BE49-F238E27FC236}">
-                <a16:creationId xmlns:a16="http://schemas.microsoft.com/office/drawing/2014/main" id="{E14EA78F-8BE3-46A3-A2ED-AEC938897423}"/>
-              </a:ext>
-            </a:extLst>
-          </p:cNvPr>
-          <p:cNvSpPr/>
-          <p:nvPr/>
-        </p:nvSpPr>
-        <p:spPr>
-          <a:xfrm>
-            <a:off x="5210175" y="5357061"/>
-            <a:ext cx="1781175" cy="1019175"/>
-          </a:xfrm>
-          <a:prstGeom prst="triangle">
-            <a:avLst/>
-          </a:prstGeom>
-        </p:spPr>
-        <p:style>
-          <a:lnRef idx="2">
-            <a:schemeClr val="dk1">
-              <a:shade val="50000"/>
-            </a:schemeClr>
-          </a:lnRef>
-          <a:fillRef idx="1">
-            <a:schemeClr val="dk1"/>
-          </a:fillRef>
-          <a:effectRef idx="0">
-            <a:schemeClr val="dk1"/>
-          </a:effectRef>
-          <a:fontRef idx="minor">
-            <a:schemeClr val="lt1"/>
-          </a:fontRef>
-        </p:style>
-        <p:txBody>
-          <a:bodyPr rtlCol="0" anchor="ctr"/>
-          <a:lstStyle/>
-          <a:p>
-            <a:pPr algn="ctr"/>
-            <a:endParaRPr lang="en-US"/>
-          </a:p>
-        </p:txBody>
-      </p:sp>
-      <p:sp>
-        <p:nvSpPr>
-          <p:cNvPr id="2" name="Title 1">
-            <a:extLst>
-              <a:ext uri="{FF2B5EF4-FFF2-40B4-BE49-F238E27FC236}">
-                <a16:creationId xmlns:a16="http://schemas.microsoft.com/office/drawing/2014/main" id="{CE7D1F5A-C74C-4522-9EA2-4BE11F79232C}"/>
-              </a:ext>
-            </a:extLst>
-          </p:cNvPr>
-          <p:cNvSpPr>
-            <a:spLocks noGrp="1"/>
-          </p:cNvSpPr>
-          <p:nvPr>
-            <p:ph type="title"/>
-          </p:nvPr>
-        </p:nvSpPr>
-        <p:spPr/>
-        <p:txBody>
-          <a:bodyPr/>
-          <a:lstStyle/>
-          <a:p>
-            <a:r>
-              <a:rPr lang="en-US" b="1" dirty="0"/>
-              <a:t>SIGN IN </a:t>
-            </a:r>
-            <a:r>
-              <a:rPr lang="en-US" dirty="0"/>
-              <a:t>Page (</a:t>
-            </a:r>
-            <a:r>
-              <a:rPr lang="en-US" dirty="0">
-                <a:solidFill>
-                  <a:srgbClr val="FF0000"/>
-                </a:solidFill>
-              </a:rPr>
-              <a:t>Modal version</a:t>
-            </a:r>
-            <a:r>
-              <a:rPr lang="en-US" dirty="0"/>
-              <a:t>)</a:t>
-            </a:r>
-          </a:p>
-        </p:txBody>
-      </p:sp>
-      <p:sp>
-        <p:nvSpPr>
-          <p:cNvPr id="9" name="Rectangle 8">
-            <a:extLst>
-              <a:ext uri="{FF2B5EF4-FFF2-40B4-BE49-F238E27FC236}">
-                <a16:creationId xmlns:a16="http://schemas.microsoft.com/office/drawing/2014/main" id="{0EE6495E-1FFE-446F-A3EA-A1933561AFE8}"/>
-              </a:ext>
-            </a:extLst>
-          </p:cNvPr>
-          <p:cNvSpPr/>
-          <p:nvPr/>
-        </p:nvSpPr>
-        <p:spPr>
-          <a:xfrm>
-            <a:off x="838200" y="1457324"/>
-            <a:ext cx="10515601" cy="4391025"/>
-          </a:xfrm>
-          <a:prstGeom prst="rect">
-            <a:avLst/>
-          </a:prstGeom>
-          <a:solidFill>
-            <a:schemeClr val="bg1">
-              <a:lumMod val="85000"/>
-            </a:schemeClr>
-          </a:solidFill>
-          <a:ln w="38100"/>
-        </p:spPr>
-        <p:style>
-          <a:lnRef idx="2">
-            <a:schemeClr val="dk1"/>
-          </a:lnRef>
-          <a:fillRef idx="1">
-            <a:schemeClr val="lt1"/>
-          </a:fillRef>
-          <a:effectRef idx="0">
-            <a:schemeClr val="dk1"/>
-          </a:effectRef>
-          <a:fontRef idx="minor">
-            <a:schemeClr val="dk1"/>
-          </a:fontRef>
-        </p:style>
-        <p:txBody>
-          <a:bodyPr rtlCol="0" anchor="t"/>
-          <a:lstStyle/>
-          <a:p>
-            <a:pPr algn="ctr"/>
-            <a:endParaRPr lang="en-US" dirty="0"/>
-          </a:p>
-        </p:txBody>
-      </p:sp>
-      <p:sp>
-        <p:nvSpPr>
-          <p:cNvPr id="10" name="Rectangle 9">
-            <a:extLst>
-              <a:ext uri="{FF2B5EF4-FFF2-40B4-BE49-F238E27FC236}">
-                <a16:creationId xmlns:a16="http://schemas.microsoft.com/office/drawing/2014/main" id="{3C560313-DD10-4CD9-9834-BE0881C64A19}"/>
-              </a:ext>
-            </a:extLst>
-          </p:cNvPr>
-          <p:cNvSpPr/>
-          <p:nvPr/>
-        </p:nvSpPr>
-        <p:spPr>
-          <a:xfrm>
-            <a:off x="2352674" y="2598820"/>
-            <a:ext cx="2286000" cy="2550695"/>
-          </a:xfrm>
-          <a:prstGeom prst="rect">
-            <a:avLst/>
-          </a:prstGeom>
-          <a:ln>
-            <a:noFill/>
-          </a:ln>
-          <a:effectLst>
-            <a:outerShdw blurRad="107950" dist="12700" dir="5400000" algn="ctr">
-              <a:srgbClr val="000000"/>
-            </a:outerShdw>
-          </a:effectLst>
-          <a:scene3d>
-            <a:camera prst="orthographicFront">
-              <a:rot lat="0" lon="0" rev="0"/>
-            </a:camera>
-            <a:lightRig rig="soft" dir="t">
-              <a:rot lat="0" lon="0" rev="0"/>
-            </a:lightRig>
-          </a:scene3d>
-          <a:sp3d contourW="44450" prstMaterial="matte">
-            <a:bevelT w="63500" h="63500" prst="artDeco"/>
-            <a:contourClr>
-              <a:srgbClr val="FFFFFF"/>
-            </a:contourClr>
-          </a:sp3d>
-        </p:spPr>
-        <p:style>
-          <a:lnRef idx="2">
-            <a:schemeClr val="accent1">
-              <a:shade val="50000"/>
-            </a:schemeClr>
-          </a:lnRef>
-          <a:fillRef idx="1">
-            <a:schemeClr val="accent1"/>
-          </a:fillRef>
-          <a:effectRef idx="0">
-            <a:schemeClr val="accent1"/>
-          </a:effectRef>
-          <a:fontRef idx="minor">
-            <a:schemeClr val="lt1"/>
-          </a:fontRef>
-        </p:style>
-        <p:txBody>
-          <a:bodyPr rtlCol="0" anchor="ctr"/>
-          <a:lstStyle/>
-          <a:p>
-            <a:pPr algn="ctr"/>
-            <a:r>
-              <a:rPr lang="en-US" sz="2200" dirty="0"/>
-              <a:t>SODA FLAVORS</a:t>
-            </a:r>
-          </a:p>
-        </p:txBody>
-      </p:sp>
-      <p:sp>
-        <p:nvSpPr>
-          <p:cNvPr id="11" name="Rectangle 10">
-            <a:extLst>
-              <a:ext uri="{FF2B5EF4-FFF2-40B4-BE49-F238E27FC236}">
-                <a16:creationId xmlns:a16="http://schemas.microsoft.com/office/drawing/2014/main" id="{3965F2FB-F5EB-46B7-90BC-F9804D3FFC8B}"/>
-              </a:ext>
-            </a:extLst>
-          </p:cNvPr>
-          <p:cNvSpPr/>
-          <p:nvPr/>
-        </p:nvSpPr>
-        <p:spPr>
-          <a:xfrm>
-            <a:off x="4953000" y="2598820"/>
-            <a:ext cx="2286000" cy="2550695"/>
-          </a:xfrm>
-          <a:prstGeom prst="rect">
-            <a:avLst/>
-          </a:prstGeom>
-          <a:ln>
-            <a:noFill/>
-          </a:ln>
-          <a:effectLst>
-            <a:outerShdw blurRad="107950" dist="12700" dir="5400000" algn="ctr">
-              <a:srgbClr val="000000"/>
-            </a:outerShdw>
-          </a:effectLst>
-          <a:scene3d>
-            <a:camera prst="orthographicFront">
-              <a:rot lat="0" lon="0" rev="0"/>
-            </a:camera>
-            <a:lightRig rig="soft" dir="t">
-              <a:rot lat="0" lon="0" rev="0"/>
-            </a:lightRig>
-          </a:scene3d>
-          <a:sp3d contourW="44450" prstMaterial="matte">
-            <a:bevelT w="63500" h="63500" prst="artDeco"/>
-            <a:contourClr>
-              <a:srgbClr val="FFFFFF"/>
-            </a:contourClr>
-          </a:sp3d>
-        </p:spPr>
-        <p:style>
-          <a:lnRef idx="2">
-            <a:schemeClr val="accent1">
-              <a:shade val="50000"/>
-            </a:schemeClr>
-          </a:lnRef>
-          <a:fillRef idx="1">
-            <a:schemeClr val="accent1"/>
-          </a:fillRef>
-          <a:effectRef idx="0">
-            <a:schemeClr val="accent1"/>
-          </a:effectRef>
-          <a:fontRef idx="minor">
-            <a:schemeClr val="lt1"/>
-          </a:fontRef>
-        </p:style>
-        <p:txBody>
-          <a:bodyPr rtlCol="0" anchor="ctr"/>
-          <a:lstStyle/>
-          <a:p>
-            <a:pPr algn="ctr"/>
-            <a:r>
-              <a:rPr lang="en-US" sz="2200" dirty="0" err="1"/>
-              <a:t>GoT</a:t>
-            </a:r>
-            <a:r>
-              <a:rPr lang="en-US" sz="2200" dirty="0"/>
-              <a:t> CHARACTERS</a:t>
-            </a:r>
-          </a:p>
-        </p:txBody>
-      </p:sp>
-      <p:sp>
-        <p:nvSpPr>
-          <p:cNvPr id="12" name="Rectangle 11">
-            <a:extLst>
-              <a:ext uri="{FF2B5EF4-FFF2-40B4-BE49-F238E27FC236}">
-                <a16:creationId xmlns:a16="http://schemas.microsoft.com/office/drawing/2014/main" id="{D7A96DB2-2A3A-4EE9-B477-71BD0022C22F}"/>
-              </a:ext>
-            </a:extLst>
-          </p:cNvPr>
-          <p:cNvSpPr/>
-          <p:nvPr/>
-        </p:nvSpPr>
-        <p:spPr>
-          <a:xfrm>
-            <a:off x="7553326" y="2598820"/>
-            <a:ext cx="2286000" cy="2550695"/>
-          </a:xfrm>
-          <a:prstGeom prst="rect">
-            <a:avLst/>
-          </a:prstGeom>
-          <a:ln>
-            <a:noFill/>
-          </a:ln>
-          <a:effectLst>
-            <a:outerShdw blurRad="107950" dist="12700" dir="5400000" algn="ctr">
-              <a:srgbClr val="000000"/>
-            </a:outerShdw>
-          </a:effectLst>
-          <a:scene3d>
-            <a:camera prst="orthographicFront">
-              <a:rot lat="0" lon="0" rev="0"/>
-            </a:camera>
-            <a:lightRig rig="soft" dir="t">
-              <a:rot lat="0" lon="0" rev="0"/>
-            </a:lightRig>
-          </a:scene3d>
-          <a:sp3d contourW="44450" prstMaterial="matte">
-            <a:bevelT w="63500" h="63500" prst="artDeco"/>
-            <a:contourClr>
-              <a:srgbClr val="FFFFFF"/>
-            </a:contourClr>
-          </a:sp3d>
-        </p:spPr>
-        <p:style>
-          <a:lnRef idx="2">
-            <a:schemeClr val="accent1">
-              <a:shade val="50000"/>
-            </a:schemeClr>
-          </a:lnRef>
-          <a:fillRef idx="1">
-            <a:schemeClr val="accent1"/>
-          </a:fillRef>
-          <a:effectRef idx="0">
-            <a:schemeClr val="accent1"/>
-          </a:effectRef>
-          <a:fontRef idx="minor">
-            <a:schemeClr val="lt1"/>
-          </a:fontRef>
-        </p:style>
-        <p:txBody>
-          <a:bodyPr rtlCol="0" anchor="ctr"/>
-          <a:lstStyle/>
-          <a:p>
-            <a:pPr algn="ctr"/>
-            <a:r>
-              <a:rPr lang="en-US" sz="2200" dirty="0"/>
-              <a:t>DORITO FLAVORS</a:t>
-            </a:r>
-          </a:p>
-        </p:txBody>
-      </p:sp>
-      <p:sp>
-        <p:nvSpPr>
-          <p:cNvPr id="13" name="Rectangle 12">
-            <a:extLst>
-              <a:ext uri="{FF2B5EF4-FFF2-40B4-BE49-F238E27FC236}">
-                <a16:creationId xmlns:a16="http://schemas.microsoft.com/office/drawing/2014/main" id="{F802E26B-5E4A-4B00-8F95-8D503221BCD6}"/>
-              </a:ext>
-            </a:extLst>
-          </p:cNvPr>
-          <p:cNvSpPr/>
-          <p:nvPr/>
-        </p:nvSpPr>
-        <p:spPr>
-          <a:xfrm>
-            <a:off x="2352674" y="5400676"/>
-            <a:ext cx="2286000" cy="402431"/>
-          </a:xfrm>
-          <a:prstGeom prst="rect">
-            <a:avLst/>
-          </a:prstGeom>
-          <a:ln>
-            <a:noFill/>
-          </a:ln>
-          <a:effectLst>
-            <a:outerShdw blurRad="107950" dist="12700" dir="5400000" algn="ctr">
-              <a:srgbClr val="000000"/>
-            </a:outerShdw>
-          </a:effectLst>
-          <a:scene3d>
-            <a:camera prst="orthographicFront">
-              <a:rot lat="0" lon="0" rev="0"/>
-            </a:camera>
-            <a:lightRig rig="soft" dir="t">
-              <a:rot lat="0" lon="0" rev="0"/>
-            </a:lightRig>
-          </a:scene3d>
-          <a:sp3d contourW="44450" prstMaterial="matte">
-            <a:bevelT w="63500" h="63500" prst="artDeco"/>
-            <a:contourClr>
-              <a:srgbClr val="FFFFFF"/>
-            </a:contourClr>
-          </a:sp3d>
-        </p:spPr>
-        <p:style>
-          <a:lnRef idx="2">
-            <a:schemeClr val="accent1">
-              <a:shade val="50000"/>
-            </a:schemeClr>
-          </a:lnRef>
-          <a:fillRef idx="1">
-            <a:schemeClr val="accent1"/>
-          </a:fillRef>
-          <a:effectRef idx="0">
-            <a:schemeClr val="accent1"/>
-          </a:effectRef>
-          <a:fontRef idx="minor">
-            <a:schemeClr val="lt1"/>
-          </a:fontRef>
-        </p:style>
-        <p:txBody>
-          <a:bodyPr rtlCol="0" anchor="ctr"/>
-          <a:lstStyle/>
-          <a:p>
-            <a:pPr algn="ctr"/>
-            <a:endParaRPr lang="en-US"/>
-          </a:p>
-        </p:txBody>
-      </p:sp>
-      <p:sp>
-        <p:nvSpPr>
-          <p:cNvPr id="14" name="Rectangle 13">
-            <a:extLst>
-              <a:ext uri="{FF2B5EF4-FFF2-40B4-BE49-F238E27FC236}">
-                <a16:creationId xmlns:a16="http://schemas.microsoft.com/office/drawing/2014/main" id="{07A2AE3A-A24D-4D2E-BA21-420D2BDDFCB6}"/>
-              </a:ext>
-            </a:extLst>
-          </p:cNvPr>
-          <p:cNvSpPr/>
-          <p:nvPr/>
-        </p:nvSpPr>
-        <p:spPr>
-          <a:xfrm>
-            <a:off x="4953000" y="5400676"/>
-            <a:ext cx="2286000" cy="402431"/>
-          </a:xfrm>
-          <a:prstGeom prst="rect">
-            <a:avLst/>
-          </a:prstGeom>
-          <a:ln>
-            <a:noFill/>
-          </a:ln>
-          <a:effectLst>
-            <a:outerShdw blurRad="107950" dist="12700" dir="5400000" algn="ctr">
-              <a:srgbClr val="000000"/>
-            </a:outerShdw>
-          </a:effectLst>
-          <a:scene3d>
-            <a:camera prst="orthographicFront">
-              <a:rot lat="0" lon="0" rev="0"/>
-            </a:camera>
-            <a:lightRig rig="soft" dir="t">
-              <a:rot lat="0" lon="0" rev="0"/>
-            </a:lightRig>
-          </a:scene3d>
-          <a:sp3d contourW="44450" prstMaterial="matte">
-            <a:bevelT w="63500" h="63500" prst="artDeco"/>
-            <a:contourClr>
-              <a:srgbClr val="FFFFFF"/>
-            </a:contourClr>
-          </a:sp3d>
-        </p:spPr>
-        <p:style>
-          <a:lnRef idx="2">
-            <a:schemeClr val="accent1">
-              <a:shade val="50000"/>
-            </a:schemeClr>
-          </a:lnRef>
-          <a:fillRef idx="1">
-            <a:schemeClr val="accent1"/>
-          </a:fillRef>
-          <a:effectRef idx="0">
-            <a:schemeClr val="accent1"/>
-          </a:effectRef>
-          <a:fontRef idx="minor">
-            <a:schemeClr val="lt1"/>
-          </a:fontRef>
-        </p:style>
-        <p:txBody>
-          <a:bodyPr rtlCol="0" anchor="ctr"/>
-          <a:lstStyle/>
-          <a:p>
-            <a:pPr algn="ctr"/>
-            <a:endParaRPr lang="en-US"/>
-          </a:p>
-        </p:txBody>
-      </p:sp>
-      <p:sp>
-        <p:nvSpPr>
-          <p:cNvPr id="15" name="Rectangle 14">
-            <a:extLst>
-              <a:ext uri="{FF2B5EF4-FFF2-40B4-BE49-F238E27FC236}">
-                <a16:creationId xmlns:a16="http://schemas.microsoft.com/office/drawing/2014/main" id="{745E1BA5-EBB3-4627-A225-478DCB30D817}"/>
-              </a:ext>
-            </a:extLst>
-          </p:cNvPr>
-          <p:cNvSpPr/>
-          <p:nvPr/>
-        </p:nvSpPr>
-        <p:spPr>
-          <a:xfrm>
-            <a:off x="7553326" y="5400676"/>
-            <a:ext cx="2286000" cy="402431"/>
-          </a:xfrm>
-          <a:prstGeom prst="rect">
-            <a:avLst/>
-          </a:prstGeom>
-          <a:ln>
-            <a:noFill/>
-          </a:ln>
-          <a:effectLst>
-            <a:outerShdw blurRad="107950" dist="12700" dir="5400000" algn="ctr">
-              <a:srgbClr val="000000"/>
-            </a:outerShdw>
-          </a:effectLst>
-          <a:scene3d>
-            <a:camera prst="orthographicFront">
-              <a:rot lat="0" lon="0" rev="0"/>
-            </a:camera>
-            <a:lightRig rig="soft" dir="t">
-              <a:rot lat="0" lon="0" rev="0"/>
-            </a:lightRig>
-          </a:scene3d>
-          <a:sp3d contourW="44450" prstMaterial="matte">
-            <a:bevelT w="63500" h="63500" prst="artDeco"/>
-            <a:contourClr>
-              <a:srgbClr val="FFFFFF"/>
-            </a:contourClr>
-          </a:sp3d>
-        </p:spPr>
-        <p:style>
-          <a:lnRef idx="2">
-            <a:schemeClr val="accent1">
-              <a:shade val="50000"/>
-            </a:schemeClr>
-          </a:lnRef>
-          <a:fillRef idx="1">
-            <a:schemeClr val="accent1"/>
-          </a:fillRef>
-          <a:effectRef idx="0">
-            <a:schemeClr val="accent1"/>
-          </a:effectRef>
-          <a:fontRef idx="minor">
-            <a:schemeClr val="lt1"/>
-          </a:fontRef>
-        </p:style>
-        <p:txBody>
-          <a:bodyPr rtlCol="0" anchor="ctr"/>
-          <a:lstStyle/>
-          <a:p>
-            <a:pPr algn="ctr"/>
-            <a:endParaRPr lang="en-US"/>
-          </a:p>
-        </p:txBody>
-      </p:sp>
-      <p:grpSp>
-        <p:nvGrpSpPr>
-          <p:cNvPr id="16" name="Group 15">
-            <a:extLst>
-              <a:ext uri="{FF2B5EF4-FFF2-40B4-BE49-F238E27FC236}">
-                <a16:creationId xmlns:a16="http://schemas.microsoft.com/office/drawing/2014/main" id="{1A3A5337-107A-4552-8220-BD5BF8552C98}"/>
-              </a:ext>
-            </a:extLst>
-          </p:cNvPr>
-          <p:cNvGrpSpPr/>
-          <p:nvPr/>
-        </p:nvGrpSpPr>
-        <p:grpSpPr>
-          <a:xfrm>
-            <a:off x="5328846" y="1559535"/>
-            <a:ext cx="1534307" cy="1015663"/>
-            <a:chOff x="5457043" y="1559535"/>
-            <a:chExt cx="1534307" cy="1015663"/>
-          </a:xfrm>
-        </p:grpSpPr>
-        <p:sp>
-          <p:nvSpPr>
-            <p:cNvPr id="17" name="TextBox 16">
-              <a:extLst>
-                <a:ext uri="{FF2B5EF4-FFF2-40B4-BE49-F238E27FC236}">
-                  <a16:creationId xmlns:a16="http://schemas.microsoft.com/office/drawing/2014/main" id="{B854781F-DCF4-4ADA-80F2-406BF30D0359}"/>
-                </a:ext>
-              </a:extLst>
-            </p:cNvPr>
-            <p:cNvSpPr txBox="1"/>
-            <p:nvPr/>
-          </p:nvSpPr>
-          <p:spPr>
-            <a:xfrm>
-              <a:off x="5457043" y="1559535"/>
-              <a:ext cx="1277914" cy="1015663"/>
-            </a:xfrm>
-            <a:prstGeom prst="rect">
-              <a:avLst/>
-            </a:prstGeom>
-            <a:noFill/>
-          </p:spPr>
-          <p:txBody>
-            <a:bodyPr wrap="none" rtlCol="0">
-              <a:spAutoFit/>
-            </a:bodyPr>
-            <a:lstStyle/>
-            <a:p>
-              <a:r>
-                <a:rPr lang="en-US" sz="6000" dirty="0">
-                  <a:solidFill>
-                    <a:schemeClr val="accent1">
-                      <a:lumMod val="75000"/>
-                    </a:schemeClr>
-                  </a:solidFill>
-                  <a:effectLst>
-                    <a:outerShdw blurRad="38100" dist="38100" dir="2700000" algn="tl">
-                      <a:srgbClr val="000000">
-                        <a:alpha val="43137"/>
-                      </a:srgbClr>
-                    </a:outerShdw>
-                  </a:effectLst>
-                </a:rPr>
-                <a:t>ALL</a:t>
-              </a:r>
-            </a:p>
-          </p:txBody>
-        </p:sp>
-        <p:sp>
-          <p:nvSpPr>
-            <p:cNvPr id="18" name="Isosceles Triangle 17">
-              <a:extLst>
-                <a:ext uri="{FF2B5EF4-FFF2-40B4-BE49-F238E27FC236}">
-                  <a16:creationId xmlns:a16="http://schemas.microsoft.com/office/drawing/2014/main" id="{A92E32FB-59B5-4BCB-A9D7-A2DDBD19F035}"/>
-                </a:ext>
-              </a:extLst>
-            </p:cNvPr>
-            <p:cNvSpPr/>
-            <p:nvPr/>
-          </p:nvSpPr>
-          <p:spPr>
-            <a:xfrm flipV="1">
-              <a:off x="6702592" y="1867179"/>
-              <a:ext cx="288758" cy="400375"/>
-            </a:xfrm>
-            <a:prstGeom prst="triangle">
-              <a:avLst/>
-            </a:prstGeom>
-            <a:solidFill>
-              <a:schemeClr val="accent1">
-                <a:lumMod val="75000"/>
-              </a:schemeClr>
-            </a:solidFill>
-            <a:ln>
-              <a:noFill/>
-            </a:ln>
-            <a:effectLst>
-              <a:outerShdw blurRad="50800" dist="38100" dir="2700000" algn="tl" rotWithShape="0">
-                <a:prstClr val="black">
-                  <a:alpha val="40000"/>
-                </a:prstClr>
-              </a:outerShdw>
-            </a:effectLst>
-          </p:spPr>
-          <p:style>
-            <a:lnRef idx="2">
-              <a:schemeClr val="accent1">
-                <a:shade val="50000"/>
-              </a:schemeClr>
-            </a:lnRef>
-            <a:fillRef idx="1">
-              <a:schemeClr val="accent1"/>
-            </a:fillRef>
-            <a:effectRef idx="0">
-              <a:schemeClr val="accent1"/>
-            </a:effectRef>
-            <a:fontRef idx="minor">
-              <a:schemeClr val="lt1"/>
-            </a:fontRef>
-          </p:style>
-          <p:txBody>
-            <a:bodyPr rtlCol="0" anchor="ctr"/>
-            <a:lstStyle/>
-            <a:p>
-              <a:pPr algn="ctr"/>
-              <a:endParaRPr lang="en-US"/>
-            </a:p>
-          </p:txBody>
-        </p:sp>
-      </p:grpSp>
-      <p:sp>
-        <p:nvSpPr>
           <p:cNvPr id="19" name="Rectangle 18">
             <a:extLst>
               <a:ext uri="{FF2B5EF4-FFF2-40B4-BE49-F238E27FC236}">
@@ -7758,136 +7555,6 @@
           </a:p>
         </p:txBody>
       </p:sp>
-      <p:grpSp>
-        <p:nvGrpSpPr>
-          <p:cNvPr id="18" name="Group 17">
-            <a:extLst>
-              <a:ext uri="{FF2B5EF4-FFF2-40B4-BE49-F238E27FC236}">
-                <a16:creationId xmlns:a16="http://schemas.microsoft.com/office/drawing/2014/main" id="{F184E590-1763-48A7-9F9C-8935641548DF}"/>
-              </a:ext>
-            </a:extLst>
-          </p:cNvPr>
-          <p:cNvGrpSpPr/>
-          <p:nvPr/>
-        </p:nvGrpSpPr>
-        <p:grpSpPr>
-          <a:xfrm>
-            <a:off x="5328846" y="1559535"/>
-            <a:ext cx="1534307" cy="1015663"/>
-            <a:chOff x="5457043" y="1559535"/>
-            <a:chExt cx="1534307" cy="1015663"/>
-          </a:xfrm>
-        </p:grpSpPr>
-        <p:sp>
-          <p:nvSpPr>
-            <p:cNvPr id="16" name="TextBox 15">
-              <a:extLst>
-                <a:ext uri="{FF2B5EF4-FFF2-40B4-BE49-F238E27FC236}">
-                  <a16:creationId xmlns:a16="http://schemas.microsoft.com/office/drawing/2014/main" id="{08488D0C-3143-44E9-8095-480FE76013FA}"/>
-                </a:ext>
-              </a:extLst>
-            </p:cNvPr>
-            <p:cNvSpPr txBox="1"/>
-            <p:nvPr/>
-          </p:nvSpPr>
-          <p:spPr>
-            <a:xfrm>
-              <a:off x="5457043" y="1559535"/>
-              <a:ext cx="1277914" cy="1015663"/>
-            </a:xfrm>
-            <a:prstGeom prst="rect">
-              <a:avLst/>
-            </a:prstGeom>
-            <a:noFill/>
-          </p:spPr>
-          <p:txBody>
-            <a:bodyPr wrap="none" rtlCol="0">
-              <a:spAutoFit/>
-            </a:bodyPr>
-            <a:lstStyle/>
-            <a:p>
-              <a:r>
-                <a:rPr lang="en-US" sz="6000" dirty="0">
-                  <a:solidFill>
-                    <a:schemeClr val="accent1">
-                      <a:lumMod val="75000"/>
-                    </a:schemeClr>
-                  </a:solidFill>
-                  <a:effectLst>
-                    <a:outerShdw blurRad="38100" dist="38100" dir="2700000" algn="tl">
-                      <a:srgbClr val="000000">
-                        <a:alpha val="43137"/>
-                      </a:srgbClr>
-                    </a:outerShdw>
-                  </a:effectLst>
-                </a:rPr>
-                <a:t>ALL</a:t>
-              </a:r>
-            </a:p>
-          </p:txBody>
-        </p:sp>
-        <p:sp>
-          <p:nvSpPr>
-            <p:cNvPr id="17" name="Isosceles Triangle 16">
-              <a:extLst>
-                <a:ext uri="{FF2B5EF4-FFF2-40B4-BE49-F238E27FC236}">
-                  <a16:creationId xmlns:a16="http://schemas.microsoft.com/office/drawing/2014/main" id="{9F954C09-03E2-4BB9-A95F-598DD4CA992C}"/>
-                </a:ext>
-              </a:extLst>
-            </p:cNvPr>
-            <p:cNvSpPr/>
-            <p:nvPr/>
-          </p:nvSpPr>
-          <p:spPr>
-            <a:xfrm flipV="1">
-              <a:off x="6702592" y="1867179"/>
-              <a:ext cx="288758" cy="400375"/>
-            </a:xfrm>
-            <a:prstGeom prst="triangle">
-              <a:avLst/>
-            </a:prstGeom>
-            <a:solidFill>
-              <a:schemeClr val="accent1">
-                <a:lumMod val="75000"/>
-              </a:schemeClr>
-            </a:solidFill>
-            <a:ln>
-              <a:noFill/>
-            </a:ln>
-            <a:effectLst>
-              <a:outerShdw blurRad="50800" dist="38100" dir="2700000" algn="tl" rotWithShape="0">
-                <a:prstClr val="black">
-                  <a:alpha val="40000"/>
-                </a:prstClr>
-              </a:outerShdw>
-            </a:effectLst>
-          </p:spPr>
-          <p:style>
-            <a:lnRef idx="2">
-              <a:schemeClr val="accent1">
-                <a:shade val="50000"/>
-              </a:schemeClr>
-            </a:lnRef>
-            <a:fillRef idx="1">
-              <a:schemeClr val="accent1"/>
-            </a:fillRef>
-            <a:effectRef idx="0">
-              <a:schemeClr val="accent1"/>
-            </a:effectRef>
-            <a:fontRef idx="minor">
-              <a:schemeClr val="lt1"/>
-            </a:fontRef>
-          </p:style>
-          <p:txBody>
-            <a:bodyPr rtlCol="0" anchor="ctr"/>
-            <a:lstStyle/>
-            <a:p>
-              <a:pPr algn="ctr"/>
-              <a:endParaRPr lang="en-US"/>
-            </a:p>
-          </p:txBody>
-        </p:sp>
-      </p:grpSp>
       <p:sp>
         <p:nvSpPr>
           <p:cNvPr id="19" name="Rectangle 18">
@@ -7936,6 +7603,209 @@
               </a:rPr>
               <a:t>PPLpleaser.com</a:t>
             </a:r>
+          </a:p>
+        </p:txBody>
+      </p:sp>
+      <p:sp>
+        <p:nvSpPr>
+          <p:cNvPr id="21" name="Rectangle 20">
+            <a:extLst>
+              <a:ext uri="{FF2B5EF4-FFF2-40B4-BE49-F238E27FC236}">
+                <a16:creationId xmlns:a16="http://schemas.microsoft.com/office/drawing/2014/main" id="{5BEAADF2-9C6A-4259-9288-6B5DCEDD385F}"/>
+              </a:ext>
+            </a:extLst>
+          </p:cNvPr>
+          <p:cNvSpPr/>
+          <p:nvPr/>
+        </p:nvSpPr>
+        <p:spPr>
+          <a:xfrm>
+            <a:off x="838199" y="1457323"/>
+            <a:ext cx="2286000" cy="4325409"/>
+          </a:xfrm>
+          <a:prstGeom prst="rect">
+            <a:avLst/>
+          </a:prstGeom>
+          <a:solidFill>
+            <a:schemeClr val="tx1">
+              <a:lumMod val="85000"/>
+              <a:lumOff val="15000"/>
+            </a:schemeClr>
+          </a:solidFill>
+        </p:spPr>
+        <p:style>
+          <a:lnRef idx="2">
+            <a:schemeClr val="accent1">
+              <a:shade val="50000"/>
+            </a:schemeClr>
+          </a:lnRef>
+          <a:fillRef idx="1">
+            <a:schemeClr val="accent1"/>
+          </a:fillRef>
+          <a:effectRef idx="0">
+            <a:schemeClr val="accent1"/>
+          </a:effectRef>
+          <a:fontRef idx="minor">
+            <a:schemeClr val="lt1"/>
+          </a:fontRef>
+        </p:style>
+        <p:txBody>
+          <a:bodyPr rtlCol="0" anchor="ctr"/>
+          <a:lstStyle/>
+          <a:p>
+            <a:pPr algn="ctr"/>
+            <a:r>
+              <a:rPr lang="en-US" sz="1100" dirty="0"/>
+              <a:t>CATEGORIES (A to Z)</a:t>
+            </a:r>
+          </a:p>
+        </p:txBody>
+      </p:sp>
+      <p:sp>
+        <p:nvSpPr>
+          <p:cNvPr id="22" name="Rectangle 21">
+            <a:extLst>
+              <a:ext uri="{FF2B5EF4-FFF2-40B4-BE49-F238E27FC236}">
+                <a16:creationId xmlns:a16="http://schemas.microsoft.com/office/drawing/2014/main" id="{3DADDAAF-8190-4017-8F68-8911DA35A476}"/>
+              </a:ext>
+            </a:extLst>
+          </p:cNvPr>
+          <p:cNvSpPr/>
+          <p:nvPr/>
+        </p:nvSpPr>
+        <p:spPr>
+          <a:xfrm>
+            <a:off x="838200" y="1457325"/>
+            <a:ext cx="10515600" cy="1112500"/>
+          </a:xfrm>
+          <a:prstGeom prst="rect">
+            <a:avLst/>
+          </a:prstGeom>
+          <a:solidFill>
+            <a:srgbClr val="192C4F"/>
+          </a:solidFill>
+        </p:spPr>
+        <p:style>
+          <a:lnRef idx="2">
+            <a:schemeClr val="accent1">
+              <a:shade val="50000"/>
+            </a:schemeClr>
+          </a:lnRef>
+          <a:fillRef idx="1">
+            <a:schemeClr val="accent1"/>
+          </a:fillRef>
+          <a:effectRef idx="0">
+            <a:schemeClr val="accent1"/>
+          </a:effectRef>
+          <a:fontRef idx="minor">
+            <a:schemeClr val="lt1"/>
+          </a:fontRef>
+        </p:style>
+        <p:txBody>
+          <a:bodyPr rtlCol="0" anchor="ctr"/>
+          <a:lstStyle/>
+          <a:p>
+            <a:pPr algn="ctr"/>
+            <a:r>
+              <a:rPr lang="en-US" sz="1600" dirty="0"/>
+              <a:t>User </a:t>
+            </a:r>
+            <a:r>
+              <a:rPr lang="en-US" sz="1600" dirty="0">
+                <a:solidFill>
+                  <a:schemeClr val="accent1">
+                    <a:lumMod val="50000"/>
+                  </a:schemeClr>
+                </a:solidFill>
+              </a:rPr>
+              <a:t>_____________</a:t>
+            </a:r>
+            <a:r>
+              <a:rPr lang="en-US" sz="1600" dirty="0"/>
+              <a:t> Password</a:t>
+            </a:r>
+            <a:r>
+              <a:rPr lang="en-US" sz="1600" dirty="0">
+                <a:solidFill>
+                  <a:schemeClr val="accent1">
+                    <a:lumMod val="50000"/>
+                  </a:schemeClr>
+                </a:solidFill>
+              </a:rPr>
+              <a:t>_____________</a:t>
+            </a:r>
+            <a:br>
+              <a:rPr lang="en-US" sz="1600" dirty="0"/>
+            </a:br>
+            <a:br>
+              <a:rPr lang="en-US" sz="1100" dirty="0"/>
+            </a:br>
+            <a:r>
+              <a:rPr lang="en-US" sz="1100" dirty="0"/>
+              <a:t>Trouble logging in?</a:t>
+            </a:r>
+          </a:p>
+        </p:txBody>
+      </p:sp>
+      <p:sp>
+        <p:nvSpPr>
+          <p:cNvPr id="3" name="Rectangle 2">
+            <a:extLst>
+              <a:ext uri="{FF2B5EF4-FFF2-40B4-BE49-F238E27FC236}">
+                <a16:creationId xmlns:a16="http://schemas.microsoft.com/office/drawing/2014/main" id="{E715912D-A023-444C-9329-E8383DF2868A}"/>
+              </a:ext>
+            </a:extLst>
+          </p:cNvPr>
+          <p:cNvSpPr/>
+          <p:nvPr/>
+        </p:nvSpPr>
+        <p:spPr>
+          <a:xfrm>
+            <a:off x="838199" y="1452031"/>
+            <a:ext cx="2286000" cy="1126414"/>
+          </a:xfrm>
+          <a:prstGeom prst="rect">
+            <a:avLst/>
+          </a:prstGeom>
+          <a:solidFill>
+            <a:schemeClr val="tx1"/>
+          </a:solidFill>
+          <a:ln>
+            <a:solidFill>
+              <a:schemeClr val="tx1"/>
+            </a:solidFill>
+          </a:ln>
+        </p:spPr>
+        <p:style>
+          <a:lnRef idx="2">
+            <a:schemeClr val="accent1">
+              <a:shade val="50000"/>
+            </a:schemeClr>
+          </a:lnRef>
+          <a:fillRef idx="1">
+            <a:schemeClr val="accent1"/>
+          </a:fillRef>
+          <a:effectRef idx="0">
+            <a:schemeClr val="accent1"/>
+          </a:effectRef>
+          <a:fontRef idx="minor">
+            <a:schemeClr val="lt1"/>
+          </a:fontRef>
+        </p:style>
+        <p:txBody>
+          <a:bodyPr rtlCol="0" anchor="ctr"/>
+          <a:lstStyle/>
+          <a:p>
+            <a:pPr algn="ctr"/>
+            <a:r>
+              <a:rPr lang="en-US">
+                <a:latin typeface="AR DELANEY" panose="02000000000000000000" pitchFamily="2" charset="0"/>
+              </a:rPr>
+              <a:t>PPLpleaser.com</a:t>
+            </a:r>
+            <a:endParaRPr lang="en-US" dirty="0">
+              <a:latin typeface="AR DELANEY" panose="02000000000000000000" pitchFamily="2" charset="0"/>
+            </a:endParaRPr>
           </a:p>
         </p:txBody>
       </p:sp>

</xml_diff>